<commit_message>
Lots of progress on loading data
</commit_message>
<xml_diff>
--- a/Meeting Presentations/06.10.2022_General_meeting.pptx
+++ b/Meeting Presentations/06.10.2022_General_meeting.pptx
@@ -8,6 +8,7 @@
     <p:sldId id="256" r:id="rId2"/>
     <p:sldId id="257" r:id="rId3"/>
     <p:sldId id="258" r:id="rId4"/>
+    <p:sldId id="259" r:id="rId5"/>
   </p:sldIdLst>
   <p:sldSz cx="12192000" cy="6858000"/>
   <p:notesSz cx="6858000" cy="9144000"/>
@@ -106,6 +107,11 @@
       </a:defRPr>
     </a:lvl9pPr>
   </p:defaultTextStyle>
+  <p:extLst>
+    <p:ext uri="{EFAFB233-063F-42B5-8137-9DF3F51BA10A}">
+      <p15:sldGuideLst xmlns:p15="http://schemas.microsoft.com/office/powerpoint/2012/main"/>
+    </p:ext>
+  </p:extLst>
 </p:presentation>
 </file>
 
@@ -265,7 +271,7 @@
           <a:p>
             <a:fld id="{5E7AA473-D82F-4EFF-9DF7-AE6D83C51288}" type="datetime1">
               <a:rPr lang="en-US" smtClean="0"/>
-              <a:t>9/8/2022</a:t>
+              <a:t>9/19/2022</a:t>
             </a:fld>
             <a:endParaRPr lang="en-US"/>
           </a:p>
@@ -519,7 +525,7 @@
           <a:p>
             <a:fld id="{1E12F1F0-FE2D-4C1C-B320-8CB9BE735F0F}" type="datetime1">
               <a:rPr lang="en-US" smtClean="0"/>
-              <a:t>9/8/2022</a:t>
+              <a:t>9/19/2022</a:t>
             </a:fld>
             <a:endParaRPr lang="en-US"/>
           </a:p>
@@ -787,7 +793,7 @@
           <a:p>
             <a:fld id="{2CF1B96C-10FD-4EBC-9029-9652B7535D02}" type="datetime1">
               <a:rPr lang="en-US" smtClean="0"/>
-              <a:t>9/8/2022</a:t>
+              <a:t>9/19/2022</a:t>
             </a:fld>
             <a:endParaRPr lang="en-US"/>
           </a:p>
@@ -1041,7 +1047,7 @@
           <a:p>
             <a:fld id="{14878474-CC00-4A95-9D50-A41C12D1EEC4}" type="datetime1">
               <a:rPr lang="en-US" smtClean="0"/>
-              <a:t>9/8/2022</a:t>
+              <a:t>9/19/2022</a:t>
             </a:fld>
             <a:endParaRPr lang="en-US"/>
           </a:p>
@@ -1319,7 +1325,7 @@
           <a:p>
             <a:fld id="{7F38C8B4-7FBB-408F-BDB9-F0496874AFB2}" type="datetime1">
               <a:rPr lang="en-US" smtClean="0"/>
-              <a:t>9/8/2022</a:t>
+              <a:t>9/19/2022</a:t>
             </a:fld>
             <a:endParaRPr lang="en-US"/>
           </a:p>
@@ -1591,7 +1597,7 @@
           <a:p>
             <a:fld id="{2BB8EE20-A5E2-47D3-8F6D-A2BA7AB2E093}" type="datetime1">
               <a:rPr lang="en-US" smtClean="0"/>
-              <a:t>9/8/2022</a:t>
+              <a:t>9/19/2022</a:t>
             </a:fld>
             <a:endParaRPr lang="en-US"/>
           </a:p>
@@ -2149,7 +2155,7 @@
           <a:p>
             <a:fld id="{3382CF99-132F-413F-B7EF-71A5C33F2ED6}" type="datetime1">
               <a:rPr lang="en-US" smtClean="0"/>
-              <a:t>9/8/2022</a:t>
+              <a:t>9/19/2022</a:t>
             </a:fld>
             <a:endParaRPr lang="en-US"/>
           </a:p>
@@ -2291,7 +2297,7 @@
           <a:p>
             <a:fld id="{1F17AE06-98E0-4D9F-A059-92C3548821BB}" type="datetime1">
               <a:rPr lang="en-US" smtClean="0"/>
-              <a:t>9/8/2022</a:t>
+              <a:t>9/19/2022</a:t>
             </a:fld>
             <a:endParaRPr lang="en-US"/>
           </a:p>
@@ -2404,7 +2410,7 @@
           <a:p>
             <a:fld id="{FFBA00CA-3DDC-4705-B840-978EF5EA0707}" type="datetime1">
               <a:rPr lang="en-US" smtClean="0"/>
-              <a:t>9/8/2022</a:t>
+              <a:t>9/19/2022</a:t>
             </a:fld>
             <a:endParaRPr lang="en-US"/>
           </a:p>
@@ -2723,7 +2729,7 @@
           <a:p>
             <a:fld id="{FC366D49-0BBA-4C5A-AD96-6448CA63451A}" type="datetime1">
               <a:rPr lang="en-US" smtClean="0"/>
-              <a:t>9/8/2022</a:t>
+              <a:t>9/19/2022</a:t>
             </a:fld>
             <a:endParaRPr lang="en-US"/>
           </a:p>
@@ -3020,7 +3026,7 @@
           <a:p>
             <a:fld id="{4F4EB293-A316-472D-A8B4-6947CF1A12B7}" type="datetime1">
               <a:rPr lang="en-US" smtClean="0"/>
-              <a:t>9/8/2022</a:t>
+              <a:t>9/19/2022</a:t>
             </a:fld>
             <a:endParaRPr lang="en-US"/>
           </a:p>
@@ -3299,7 +3305,7 @@
           <a:p>
             <a:fld id="{734BCCD4-CEB1-405B-A443-DD9CBCBEA552}" type="datetime1">
               <a:rPr lang="en-US" smtClean="0"/>
-              <a:t>9/8/2022</a:t>
+              <a:t>9/19/2022</a:t>
             </a:fld>
             <a:endParaRPr lang="en-US"/>
           </a:p>
@@ -4653,6 +4659,176 @@
 </p:sld>
 </file>
 
+<file path=ppt/slides/slide4.xml><?xml version="1.0" encoding="utf-8"?>
+<p:sld xmlns:a="http://schemas.openxmlformats.org/drawingml/2006/main" xmlns:r="http://schemas.openxmlformats.org/officeDocument/2006/relationships" xmlns:p="http://schemas.openxmlformats.org/presentationml/2006/main">
+  <p:cSld>
+    <p:spTree>
+      <p:nvGrpSpPr>
+        <p:cNvPr id="1" name=""/>
+        <p:cNvGrpSpPr/>
+        <p:nvPr/>
+      </p:nvGrpSpPr>
+      <p:grpSpPr>
+        <a:xfrm>
+          <a:off x="0" y="0"/>
+          <a:ext cx="0" cy="0"/>
+          <a:chOff x="0" y="0"/>
+          <a:chExt cx="0" cy="0"/>
+        </a:xfrm>
+      </p:grpSpPr>
+      <p:sp>
+        <p:nvSpPr>
+          <p:cNvPr id="2" name="Title 1">
+            <a:extLst>
+              <a:ext uri="{FF2B5EF4-FFF2-40B4-BE49-F238E27FC236}">
+                <a16:creationId xmlns:a16="http://schemas.microsoft.com/office/drawing/2014/main" id="{0101512F-ECF0-4CDC-8C8D-1FE82858E1A7}"/>
+              </a:ext>
+            </a:extLst>
+          </p:cNvPr>
+          <p:cNvSpPr>
+            <a:spLocks noGrp="1"/>
+          </p:cNvSpPr>
+          <p:nvPr>
+            <p:ph type="title"/>
+          </p:nvPr>
+        </p:nvSpPr>
+        <p:spPr/>
+        <p:txBody>
+          <a:bodyPr/>
+          <a:lstStyle/>
+          <a:p>
+            <a:r>
+              <a:rPr lang="nb-NO" dirty="0"/>
+              <a:t>Plan</a:t>
+            </a:r>
+            <a:endParaRPr lang="en-GB" dirty="0"/>
+          </a:p>
+        </p:txBody>
+      </p:sp>
+      <p:sp>
+        <p:nvSpPr>
+          <p:cNvPr id="3" name="Content Placeholder 2">
+            <a:extLst>
+              <a:ext uri="{FF2B5EF4-FFF2-40B4-BE49-F238E27FC236}">
+                <a16:creationId xmlns:a16="http://schemas.microsoft.com/office/drawing/2014/main" id="{92DD4BF0-2CED-4E4A-BC8C-833B3C2A9C25}"/>
+              </a:ext>
+            </a:extLst>
+          </p:cNvPr>
+          <p:cNvSpPr>
+            <a:spLocks noGrp="1"/>
+          </p:cNvSpPr>
+          <p:nvPr>
+            <p:ph idx="1"/>
+          </p:nvPr>
+        </p:nvSpPr>
+        <p:spPr/>
+        <p:txBody>
+          <a:bodyPr/>
+          <a:lstStyle/>
+          <a:p>
+            <a:r>
+              <a:rPr lang="nb-NO" dirty="0" err="1"/>
+              <a:t>Running</a:t>
+            </a:r>
+            <a:r>
+              <a:rPr lang="nb-NO" dirty="0"/>
+              <a:t> </a:t>
+            </a:r>
+            <a:r>
+              <a:rPr lang="nb-NO" dirty="0" err="1"/>
+              <a:t>models</a:t>
+            </a:r>
+            <a:r>
+              <a:rPr lang="nb-NO" dirty="0"/>
+              <a:t> - </a:t>
+            </a:r>
+            <a:r>
+              <a:rPr lang="nb-NO" dirty="0" err="1"/>
+              <a:t>meanwhile</a:t>
+            </a:r>
+            <a:r>
+              <a:rPr lang="nb-NO" dirty="0"/>
+              <a:t> </a:t>
+            </a:r>
+            <a:r>
+              <a:rPr lang="nb-NO" dirty="0" err="1"/>
+              <a:t>writing</a:t>
+            </a:r>
+            <a:r>
+              <a:rPr lang="nb-NO" dirty="0"/>
+              <a:t> </a:t>
+            </a:r>
+            <a:r>
+              <a:rPr lang="nb-NO" dirty="0" err="1"/>
+              <a:t>theory</a:t>
+            </a:r>
+            <a:endParaRPr lang="nb-NO" dirty="0"/>
+          </a:p>
+          <a:p>
+            <a:r>
+              <a:rPr lang="nb-NO" dirty="0" err="1"/>
+              <a:t>Depending</a:t>
+            </a:r>
+            <a:r>
+              <a:rPr lang="nb-NO" dirty="0"/>
+              <a:t> </a:t>
+            </a:r>
+            <a:r>
+              <a:rPr lang="nb-NO" dirty="0" err="1"/>
+              <a:t>on</a:t>
+            </a:r>
+            <a:r>
+              <a:rPr lang="nb-NO" dirty="0"/>
+              <a:t> </a:t>
+            </a:r>
+            <a:r>
+              <a:rPr lang="nb-NO" dirty="0" err="1"/>
+              <a:t>results</a:t>
+            </a:r>
+            <a:r>
+              <a:rPr lang="nb-NO" dirty="0"/>
+              <a:t> </a:t>
+            </a:r>
+            <a:r>
+              <a:rPr lang="nb-NO" dirty="0" err="1"/>
+              <a:t>change</a:t>
+            </a:r>
+            <a:r>
+              <a:rPr lang="nb-NO" dirty="0"/>
+              <a:t> </a:t>
+            </a:r>
+            <a:r>
+              <a:rPr lang="nb-NO" dirty="0" err="1"/>
+              <a:t>things</a:t>
+            </a:r>
+            <a:r>
+              <a:rPr lang="nb-NO" dirty="0"/>
+              <a:t> </a:t>
+            </a:r>
+            <a:r>
+              <a:rPr lang="nb-NO" dirty="0" err="1"/>
+              <a:t>underway</a:t>
+            </a:r>
+            <a:endParaRPr lang="nb-NO" dirty="0"/>
+          </a:p>
+          <a:p>
+            <a:endParaRPr lang="en-GB" dirty="0"/>
+          </a:p>
+        </p:txBody>
+      </p:sp>
+    </p:spTree>
+    <p:extLst>
+      <p:ext uri="{BB962C8B-B14F-4D97-AF65-F5344CB8AC3E}">
+        <p14:creationId xmlns:p14="http://schemas.microsoft.com/office/powerpoint/2010/main" val="57127397"/>
+      </p:ext>
+    </p:extLst>
+  </p:cSld>
+  <p:clrMapOvr>
+    <a:masterClrMapping/>
+  </p:clrMapOvr>
+</p:sld>
+</file>
+
 <file path=ppt/theme/theme1.xml><?xml version="1.0" encoding="utf-8"?>
 <a:theme xmlns:a="http://schemas.openxmlformats.org/drawingml/2006/main" name="GestaltVTI">
   <a:themeElements>

</xml_diff>

<commit_message>
Data handlig code in Feat_aug.py & testing
</commit_message>
<xml_diff>
--- a/Meeting Presentations/06.10.2022_General_meeting.pptx
+++ b/Meeting Presentations/06.10.2022_General_meeting.pptx
@@ -9,6 +9,7 @@
     <p:sldId id="257" r:id="rId3"/>
     <p:sldId id="258" r:id="rId4"/>
     <p:sldId id="259" r:id="rId5"/>
+    <p:sldId id="260" r:id="rId6"/>
   </p:sldIdLst>
   <p:sldSz cx="12192000" cy="6858000"/>
   <p:notesSz cx="6858000" cy="9144000"/>
@@ -271,7 +272,7 @@
           <a:p>
             <a:fld id="{5E7AA473-D82F-4EFF-9DF7-AE6D83C51288}" type="datetime1">
               <a:rPr lang="en-US" smtClean="0"/>
-              <a:t>9/19/2022</a:t>
+              <a:t>9/21/2022</a:t>
             </a:fld>
             <a:endParaRPr lang="en-US"/>
           </a:p>
@@ -525,7 +526,7 @@
           <a:p>
             <a:fld id="{1E12F1F0-FE2D-4C1C-B320-8CB9BE735F0F}" type="datetime1">
               <a:rPr lang="en-US" smtClean="0"/>
-              <a:t>9/19/2022</a:t>
+              <a:t>9/21/2022</a:t>
             </a:fld>
             <a:endParaRPr lang="en-US"/>
           </a:p>
@@ -793,7 +794,7 @@
           <a:p>
             <a:fld id="{2CF1B96C-10FD-4EBC-9029-9652B7535D02}" type="datetime1">
               <a:rPr lang="en-US" smtClean="0"/>
-              <a:t>9/19/2022</a:t>
+              <a:t>9/21/2022</a:t>
             </a:fld>
             <a:endParaRPr lang="en-US"/>
           </a:p>
@@ -1047,7 +1048,7 @@
           <a:p>
             <a:fld id="{14878474-CC00-4A95-9D50-A41C12D1EEC4}" type="datetime1">
               <a:rPr lang="en-US" smtClean="0"/>
-              <a:t>9/19/2022</a:t>
+              <a:t>9/21/2022</a:t>
             </a:fld>
             <a:endParaRPr lang="en-US"/>
           </a:p>
@@ -1325,7 +1326,7 @@
           <a:p>
             <a:fld id="{7F38C8B4-7FBB-408F-BDB9-F0496874AFB2}" type="datetime1">
               <a:rPr lang="en-US" smtClean="0"/>
-              <a:t>9/19/2022</a:t>
+              <a:t>9/21/2022</a:t>
             </a:fld>
             <a:endParaRPr lang="en-US"/>
           </a:p>
@@ -1597,7 +1598,7 @@
           <a:p>
             <a:fld id="{2BB8EE20-A5E2-47D3-8F6D-A2BA7AB2E093}" type="datetime1">
               <a:rPr lang="en-US" smtClean="0"/>
-              <a:t>9/19/2022</a:t>
+              <a:t>9/21/2022</a:t>
             </a:fld>
             <a:endParaRPr lang="en-US"/>
           </a:p>
@@ -2155,7 +2156,7 @@
           <a:p>
             <a:fld id="{3382CF99-132F-413F-B7EF-71A5C33F2ED6}" type="datetime1">
               <a:rPr lang="en-US" smtClean="0"/>
-              <a:t>9/19/2022</a:t>
+              <a:t>9/21/2022</a:t>
             </a:fld>
             <a:endParaRPr lang="en-US"/>
           </a:p>
@@ -2297,7 +2298,7 @@
           <a:p>
             <a:fld id="{1F17AE06-98E0-4D9F-A059-92C3548821BB}" type="datetime1">
               <a:rPr lang="en-US" smtClean="0"/>
-              <a:t>9/19/2022</a:t>
+              <a:t>9/21/2022</a:t>
             </a:fld>
             <a:endParaRPr lang="en-US"/>
           </a:p>
@@ -2410,7 +2411,7 @@
           <a:p>
             <a:fld id="{FFBA00CA-3DDC-4705-B840-978EF5EA0707}" type="datetime1">
               <a:rPr lang="en-US" smtClean="0"/>
-              <a:t>9/19/2022</a:t>
+              <a:t>9/21/2022</a:t>
             </a:fld>
             <a:endParaRPr lang="en-US"/>
           </a:p>
@@ -2729,7 +2730,7 @@
           <a:p>
             <a:fld id="{FC366D49-0BBA-4C5A-AD96-6448CA63451A}" type="datetime1">
               <a:rPr lang="en-US" smtClean="0"/>
-              <a:t>9/19/2022</a:t>
+              <a:t>9/21/2022</a:t>
             </a:fld>
             <a:endParaRPr lang="en-US"/>
           </a:p>
@@ -3026,7 +3027,7 @@
           <a:p>
             <a:fld id="{4F4EB293-A316-472D-A8B4-6947CF1A12B7}" type="datetime1">
               <a:rPr lang="en-US" smtClean="0"/>
-              <a:t>9/19/2022</a:t>
+              <a:t>9/21/2022</a:t>
             </a:fld>
             <a:endParaRPr lang="en-US"/>
           </a:p>
@@ -3305,7 +3306,7 @@
           <a:p>
             <a:fld id="{734BCCD4-CEB1-405B-A443-DD9CBCBEA552}" type="datetime1">
               <a:rPr lang="en-US" smtClean="0"/>
-              <a:t>9/19/2022</a:t>
+              <a:t>9/21/2022</a:t>
             </a:fld>
             <a:endParaRPr lang="en-US"/>
           </a:p>
@@ -4829,6 +4830,116 @@
 </p:sld>
 </file>
 
+<file path=ppt/slides/slide5.xml><?xml version="1.0" encoding="utf-8"?>
+<p:sld xmlns:a="http://schemas.openxmlformats.org/drawingml/2006/main" xmlns:r="http://schemas.openxmlformats.org/officeDocument/2006/relationships" xmlns:p="http://schemas.openxmlformats.org/presentationml/2006/main">
+  <p:cSld>
+    <p:spTree>
+      <p:nvGrpSpPr>
+        <p:cNvPr id="1" name=""/>
+        <p:cNvGrpSpPr/>
+        <p:nvPr/>
+      </p:nvGrpSpPr>
+      <p:grpSpPr>
+        <a:xfrm>
+          <a:off x="0" y="0"/>
+          <a:ext cx="0" cy="0"/>
+          <a:chOff x="0" y="0"/>
+          <a:chExt cx="0" cy="0"/>
+        </a:xfrm>
+      </p:grpSpPr>
+      <p:sp>
+        <p:nvSpPr>
+          <p:cNvPr id="2" name="Title 1">
+            <a:extLst>
+              <a:ext uri="{FF2B5EF4-FFF2-40B4-BE49-F238E27FC236}">
+                <a16:creationId xmlns:a16="http://schemas.microsoft.com/office/drawing/2014/main" id="{12258E73-6AE5-4223-B21E-5F34CFBE2733}"/>
+              </a:ext>
+            </a:extLst>
+          </p:cNvPr>
+          <p:cNvSpPr>
+            <a:spLocks noGrp="1"/>
+          </p:cNvSpPr>
+          <p:nvPr>
+            <p:ph type="title"/>
+          </p:nvPr>
+        </p:nvSpPr>
+        <p:spPr/>
+        <p:txBody>
+          <a:bodyPr/>
+          <a:lstStyle/>
+          <a:p>
+            <a:r>
+              <a:rPr lang="nb-NO" dirty="0" err="1"/>
+              <a:t>Misc</a:t>
+            </a:r>
+            <a:endParaRPr lang="en-GB" dirty="0"/>
+          </a:p>
+        </p:txBody>
+      </p:sp>
+      <p:sp>
+        <p:nvSpPr>
+          <p:cNvPr id="3" name="Content Placeholder 2">
+            <a:extLst>
+              <a:ext uri="{FF2B5EF4-FFF2-40B4-BE49-F238E27FC236}">
+                <a16:creationId xmlns:a16="http://schemas.microsoft.com/office/drawing/2014/main" id="{E9B0CAFF-4335-4587-B8AD-BD8918EA374C}"/>
+              </a:ext>
+            </a:extLst>
+          </p:cNvPr>
+          <p:cNvSpPr>
+            <a:spLocks noGrp="1"/>
+          </p:cNvSpPr>
+          <p:nvPr>
+            <p:ph idx="1"/>
+          </p:nvPr>
+        </p:nvSpPr>
+        <p:spPr/>
+        <p:txBody>
+          <a:bodyPr>
+            <a:normAutofit/>
+          </a:bodyPr>
+          <a:lstStyle/>
+          <a:p>
+            <a:r>
+              <a:rPr lang="nb-NO" sz="1800" dirty="0" err="1"/>
+              <a:t>Causal</a:t>
+            </a:r>
+            <a:r>
+              <a:rPr lang="nb-NO" sz="1800" dirty="0"/>
+              <a:t> </a:t>
+            </a:r>
+            <a:r>
+              <a:rPr lang="nb-NO" sz="1800" dirty="0" err="1"/>
+              <a:t>padding</a:t>
+            </a:r>
+            <a:r>
+              <a:rPr lang="nb-NO" sz="1800" dirty="0"/>
+              <a:t> is not </a:t>
+            </a:r>
+            <a:r>
+              <a:rPr lang="nb-NO" sz="1800" dirty="0" err="1"/>
+              <a:t>supported</a:t>
+            </a:r>
+            <a:r>
+              <a:rPr lang="nb-NO" sz="1800" dirty="0"/>
+              <a:t> for Conv2D</a:t>
+            </a:r>
+            <a:endParaRPr lang="en-GB" sz="1800" dirty="0"/>
+          </a:p>
+        </p:txBody>
+      </p:sp>
+    </p:spTree>
+    <p:extLst>
+      <p:ext uri="{BB962C8B-B14F-4D97-AF65-F5344CB8AC3E}">
+        <p14:creationId xmlns:p14="http://schemas.microsoft.com/office/powerpoint/2010/main" val="1721430244"/>
+      </p:ext>
+    </p:extLst>
+  </p:cSld>
+  <p:clrMapOvr>
+    <a:masterClrMapping/>
+  </p:clrMapOvr>
+</p:sld>
+</file>
+
 <file path=ppt/theme/theme1.xml><?xml version="1.0" encoding="utf-8"?>
 <a:theme xmlns:a="http://schemas.openxmlformats.org/drawingml/2006/main" name="GestaltVTI">
   <a:themeElements>

</xml_diff>

<commit_message>
Saving model script in progress
</commit_message>
<xml_diff>
--- a/Meeting Presentations/06.10.2022_General_meeting.pptx
+++ b/Meeting Presentations/06.10.2022_General_meeting.pptx
@@ -8,9 +8,10 @@
     <p:sldId id="256" r:id="rId2"/>
     <p:sldId id="257" r:id="rId3"/>
     <p:sldId id="258" r:id="rId4"/>
-    <p:sldId id="259" r:id="rId5"/>
-    <p:sldId id="261" r:id="rId6"/>
-    <p:sldId id="260" r:id="rId7"/>
+    <p:sldId id="262" r:id="rId5"/>
+    <p:sldId id="259" r:id="rId6"/>
+    <p:sldId id="261" r:id="rId7"/>
+    <p:sldId id="260" r:id="rId8"/>
   </p:sldIdLst>
   <p:sldSz cx="12192000" cy="6858000"/>
   <p:notesSz cx="6858000" cy="9144000"/>
@@ -273,7 +274,7 @@
           <a:p>
             <a:fld id="{5E7AA473-D82F-4EFF-9DF7-AE6D83C51288}" type="datetime1">
               <a:rPr lang="en-US" smtClean="0"/>
-              <a:t>9/21/2022</a:t>
+              <a:t>9/28/2022</a:t>
             </a:fld>
             <a:endParaRPr lang="en-US"/>
           </a:p>
@@ -527,7 +528,7 @@
           <a:p>
             <a:fld id="{1E12F1F0-FE2D-4C1C-B320-8CB9BE735F0F}" type="datetime1">
               <a:rPr lang="en-US" smtClean="0"/>
-              <a:t>9/21/2022</a:t>
+              <a:t>9/28/2022</a:t>
             </a:fld>
             <a:endParaRPr lang="en-US"/>
           </a:p>
@@ -795,7 +796,7 @@
           <a:p>
             <a:fld id="{2CF1B96C-10FD-4EBC-9029-9652B7535D02}" type="datetime1">
               <a:rPr lang="en-US" smtClean="0"/>
-              <a:t>9/21/2022</a:t>
+              <a:t>9/28/2022</a:t>
             </a:fld>
             <a:endParaRPr lang="en-US"/>
           </a:p>
@@ -1049,7 +1050,7 @@
           <a:p>
             <a:fld id="{14878474-CC00-4A95-9D50-A41C12D1EEC4}" type="datetime1">
               <a:rPr lang="en-US" smtClean="0"/>
-              <a:t>9/21/2022</a:t>
+              <a:t>9/28/2022</a:t>
             </a:fld>
             <a:endParaRPr lang="en-US"/>
           </a:p>
@@ -1327,7 +1328,7 @@
           <a:p>
             <a:fld id="{7F38C8B4-7FBB-408F-BDB9-F0496874AFB2}" type="datetime1">
               <a:rPr lang="en-US" smtClean="0"/>
-              <a:t>9/21/2022</a:t>
+              <a:t>9/28/2022</a:t>
             </a:fld>
             <a:endParaRPr lang="en-US"/>
           </a:p>
@@ -1599,7 +1600,7 @@
           <a:p>
             <a:fld id="{2BB8EE20-A5E2-47D3-8F6D-A2BA7AB2E093}" type="datetime1">
               <a:rPr lang="en-US" smtClean="0"/>
-              <a:t>9/21/2022</a:t>
+              <a:t>9/28/2022</a:t>
             </a:fld>
             <a:endParaRPr lang="en-US"/>
           </a:p>
@@ -2157,7 +2158,7 @@
           <a:p>
             <a:fld id="{3382CF99-132F-413F-B7EF-71A5C33F2ED6}" type="datetime1">
               <a:rPr lang="en-US" smtClean="0"/>
-              <a:t>9/21/2022</a:t>
+              <a:t>9/28/2022</a:t>
             </a:fld>
             <a:endParaRPr lang="en-US"/>
           </a:p>
@@ -2299,7 +2300,7 @@
           <a:p>
             <a:fld id="{1F17AE06-98E0-4D9F-A059-92C3548821BB}" type="datetime1">
               <a:rPr lang="en-US" smtClean="0"/>
-              <a:t>9/21/2022</a:t>
+              <a:t>9/28/2022</a:t>
             </a:fld>
             <a:endParaRPr lang="en-US"/>
           </a:p>
@@ -2412,7 +2413,7 @@
           <a:p>
             <a:fld id="{FFBA00CA-3DDC-4705-B840-978EF5EA0707}" type="datetime1">
               <a:rPr lang="en-US" smtClean="0"/>
-              <a:t>9/21/2022</a:t>
+              <a:t>9/28/2022</a:t>
             </a:fld>
             <a:endParaRPr lang="en-US"/>
           </a:p>
@@ -2731,7 +2732,7 @@
           <a:p>
             <a:fld id="{FC366D49-0BBA-4C5A-AD96-6448CA63451A}" type="datetime1">
               <a:rPr lang="en-US" smtClean="0"/>
-              <a:t>9/21/2022</a:t>
+              <a:t>9/28/2022</a:t>
             </a:fld>
             <a:endParaRPr lang="en-US"/>
           </a:p>
@@ -3028,7 +3029,7 @@
           <a:p>
             <a:fld id="{4F4EB293-A316-472D-A8B4-6947CF1A12B7}" type="datetime1">
               <a:rPr lang="en-US" smtClean="0"/>
-              <a:t>9/21/2022</a:t>
+              <a:t>9/28/2022</a:t>
             </a:fld>
             <a:endParaRPr lang="en-US"/>
           </a:p>
@@ -3307,7 +3308,7 @@
           <a:p>
             <a:fld id="{734BCCD4-CEB1-405B-A443-DD9CBCBEA552}" type="datetime1">
               <a:rPr lang="en-US" smtClean="0"/>
-              <a:t>9/21/2022</a:t>
+              <a:t>9/28/2022</a:t>
             </a:fld>
             <a:endParaRPr lang="en-US"/>
           </a:p>
@@ -4683,6 +4684,421 @@
           <p:cNvPr id="2" name="Title 1">
             <a:extLst>
               <a:ext uri="{FF2B5EF4-FFF2-40B4-BE49-F238E27FC236}">
+                <a16:creationId xmlns:a16="http://schemas.microsoft.com/office/drawing/2014/main" id="{32D1EE79-E0B2-4C6A-976F-177946C18C33}"/>
+              </a:ext>
+            </a:extLst>
+          </p:cNvPr>
+          <p:cNvSpPr>
+            <a:spLocks noGrp="1"/>
+          </p:cNvSpPr>
+          <p:nvPr>
+            <p:ph type="title"/>
+          </p:nvPr>
+        </p:nvSpPr>
+        <p:spPr>
+          <a:xfrm>
+            <a:off x="517870" y="978409"/>
+            <a:ext cx="5021182" cy="1949350"/>
+          </a:xfrm>
+        </p:spPr>
+        <p:txBody>
+          <a:bodyPr/>
+          <a:lstStyle/>
+          <a:p>
+            <a:r>
+              <a:rPr lang="nb-NO" dirty="0" err="1"/>
+              <a:t>Current</a:t>
+            </a:r>
+            <a:r>
+              <a:rPr lang="nb-NO" dirty="0"/>
+              <a:t> status for </a:t>
+            </a:r>
+            <a:r>
+              <a:rPr lang="nb-NO" dirty="0" err="1"/>
+              <a:t>the</a:t>
+            </a:r>
+            <a:r>
+              <a:rPr lang="nb-NO" dirty="0"/>
+              <a:t> </a:t>
+            </a:r>
+            <a:r>
+              <a:rPr lang="nb-NO" dirty="0" err="1"/>
+              <a:t>models</a:t>
+            </a:r>
+            <a:endParaRPr lang="en-GB" dirty="0"/>
+          </a:p>
+        </p:txBody>
+      </p:sp>
+      <p:sp>
+        <p:nvSpPr>
+          <p:cNvPr id="3" name="Content Placeholder 2">
+            <a:extLst>
+              <a:ext uri="{FF2B5EF4-FFF2-40B4-BE49-F238E27FC236}">
+                <a16:creationId xmlns:a16="http://schemas.microsoft.com/office/drawing/2014/main" id="{FD05321F-3F64-4D06-B066-65739C62FD2A}"/>
+              </a:ext>
+            </a:extLst>
+          </p:cNvPr>
+          <p:cNvSpPr>
+            <a:spLocks noGrp="1"/>
+          </p:cNvSpPr>
+          <p:nvPr>
+            <p:ph idx="1"/>
+          </p:nvPr>
+        </p:nvSpPr>
+        <p:spPr>
+          <a:xfrm>
+            <a:off x="578840" y="2927759"/>
+            <a:ext cx="11104510" cy="2911962"/>
+          </a:xfrm>
+        </p:spPr>
+        <p:txBody>
+          <a:bodyPr/>
+          <a:lstStyle/>
+          <a:p>
+            <a:r>
+              <a:rPr lang="nb-NO" dirty="0"/>
+              <a:t>I have ran </a:t>
+            </a:r>
+            <a:r>
+              <a:rPr lang="nb-NO" dirty="0" err="1"/>
+              <a:t>some</a:t>
+            </a:r>
+            <a:r>
+              <a:rPr lang="nb-NO" dirty="0"/>
+              <a:t> 1D </a:t>
+            </a:r>
+            <a:r>
+              <a:rPr lang="nb-NO" dirty="0" err="1"/>
+              <a:t>reconstruction</a:t>
+            </a:r>
+            <a:r>
+              <a:rPr lang="nb-NO" dirty="0"/>
+              <a:t> </a:t>
+            </a:r>
+            <a:r>
+              <a:rPr lang="nb-NO" dirty="0" err="1"/>
+              <a:t>models</a:t>
+            </a:r>
+            <a:r>
+              <a:rPr lang="nb-NO" dirty="0"/>
+              <a:t>;</a:t>
+            </a:r>
+          </a:p>
+          <a:p>
+            <a:r>
+              <a:rPr lang="nb-NO" dirty="0" err="1"/>
+              <a:t>Focusing</a:t>
+            </a:r>
+            <a:r>
+              <a:rPr lang="nb-NO" dirty="0"/>
+              <a:t> </a:t>
+            </a:r>
+            <a:r>
+              <a:rPr lang="nb-NO" dirty="0" err="1"/>
+              <a:t>on</a:t>
+            </a:r>
+            <a:r>
+              <a:rPr lang="nb-NO" dirty="0"/>
+              <a:t> </a:t>
+            </a:r>
+            <a:r>
+              <a:rPr lang="nb-NO" dirty="0" err="1"/>
+              <a:t>getting</a:t>
+            </a:r>
+            <a:r>
+              <a:rPr lang="nb-NO" dirty="0"/>
+              <a:t> </a:t>
+            </a:r>
+            <a:r>
+              <a:rPr lang="nb-NO" dirty="0" err="1"/>
+              <a:t>good</a:t>
+            </a:r>
+            <a:r>
+              <a:rPr lang="nb-NO" dirty="0"/>
+              <a:t> </a:t>
+            </a:r>
+            <a:r>
+              <a:rPr lang="nb-NO" dirty="0" err="1"/>
+              <a:t>procedures</a:t>
+            </a:r>
+            <a:r>
+              <a:rPr lang="nb-NO" dirty="0"/>
+              <a:t> for </a:t>
+            </a:r>
+            <a:r>
+              <a:rPr lang="nb-NO" dirty="0" err="1"/>
+              <a:t>running</a:t>
+            </a:r>
+            <a:r>
+              <a:rPr lang="nb-NO" dirty="0"/>
+              <a:t> </a:t>
+            </a:r>
+            <a:r>
+              <a:rPr lang="nb-NO" dirty="0" err="1"/>
+              <a:t>the</a:t>
+            </a:r>
+            <a:r>
+              <a:rPr lang="nb-NO" dirty="0"/>
+              <a:t> </a:t>
+            </a:r>
+            <a:r>
+              <a:rPr lang="nb-NO" dirty="0" err="1"/>
+              <a:t>models</a:t>
+            </a:r>
+            <a:r>
+              <a:rPr lang="nb-NO" dirty="0"/>
+              <a:t> </a:t>
+            </a:r>
+            <a:r>
+              <a:rPr lang="nb-NO" dirty="0" err="1"/>
+              <a:t>on</a:t>
+            </a:r>
+            <a:r>
+              <a:rPr lang="nb-NO" dirty="0"/>
+              <a:t> </a:t>
+            </a:r>
+            <a:r>
+              <a:rPr lang="nb-NO" dirty="0" err="1"/>
+              <a:t>the</a:t>
+            </a:r>
+            <a:r>
+              <a:rPr lang="nb-NO" dirty="0"/>
+              <a:t> servers</a:t>
+            </a:r>
+          </a:p>
+          <a:p>
+            <a:r>
+              <a:rPr lang="nb-NO" b="1" dirty="0"/>
+              <a:t>Profiling:</a:t>
+            </a:r>
+          </a:p>
+          <a:p>
+            <a:r>
+              <a:rPr lang="nb-NO" b="1" dirty="0"/>
+              <a:t>	</a:t>
+            </a:r>
+            <a:r>
+              <a:rPr lang="nb-NO" dirty="0"/>
+              <a:t>I </a:t>
+            </a:r>
+            <a:r>
+              <a:rPr lang="nb-NO" dirty="0" err="1"/>
+              <a:t>did</a:t>
+            </a:r>
+            <a:r>
+              <a:rPr lang="nb-NO" dirty="0"/>
+              <a:t> not </a:t>
+            </a:r>
+            <a:r>
+              <a:rPr lang="nb-NO" dirty="0" err="1"/>
+              <a:t>get</a:t>
+            </a:r>
+            <a:r>
+              <a:rPr lang="nb-NO" dirty="0"/>
+              <a:t> </a:t>
+            </a:r>
+            <a:r>
+              <a:rPr lang="nb-NO" dirty="0" err="1"/>
+              <a:t>very</a:t>
+            </a:r>
+            <a:r>
+              <a:rPr lang="nb-NO" dirty="0"/>
+              <a:t> </a:t>
+            </a:r>
+            <a:r>
+              <a:rPr lang="nb-NO" dirty="0" err="1"/>
+              <a:t>good</a:t>
+            </a:r>
+            <a:r>
+              <a:rPr lang="nb-NO" dirty="0"/>
+              <a:t> </a:t>
+            </a:r>
+            <a:r>
+              <a:rPr lang="nb-NO" dirty="0" err="1"/>
+              <a:t>results</a:t>
+            </a:r>
+            <a:r>
+              <a:rPr lang="nb-NO" dirty="0"/>
+              <a:t> for 	</a:t>
+            </a:r>
+            <a:r>
+              <a:rPr lang="nb-NO" dirty="0" err="1"/>
+              <a:t>running</a:t>
+            </a:r>
+            <a:r>
+              <a:rPr lang="nb-NO" dirty="0"/>
+              <a:t> </a:t>
+            </a:r>
+            <a:r>
+              <a:rPr lang="nb-NO" dirty="0" err="1"/>
+              <a:t>on</a:t>
+            </a:r>
+            <a:r>
+              <a:rPr lang="nb-NO" dirty="0"/>
+              <a:t> Odin. My laptop </a:t>
+            </a:r>
+            <a:r>
+              <a:rPr lang="nb-NO" dirty="0" err="1"/>
+              <a:t>performed</a:t>
+            </a:r>
+            <a:r>
+              <a:rPr lang="nb-NO" dirty="0"/>
+              <a:t> </a:t>
+            </a:r>
+            <a:r>
+              <a:rPr lang="nb-NO" dirty="0" err="1"/>
+              <a:t>better</a:t>
+            </a:r>
+            <a:r>
+              <a:rPr lang="nb-NO" dirty="0"/>
+              <a:t>; </a:t>
+            </a:r>
+            <a:r>
+              <a:rPr lang="nb-NO" dirty="0" err="1"/>
+              <a:t>Probably</a:t>
+            </a:r>
+            <a:r>
+              <a:rPr lang="nb-NO" dirty="0"/>
+              <a:t> 	</a:t>
+            </a:r>
+            <a:r>
+              <a:rPr lang="nb-NO" dirty="0" err="1"/>
+              <a:t>because</a:t>
+            </a:r>
+            <a:r>
+              <a:rPr lang="nb-NO" dirty="0"/>
+              <a:t> </a:t>
+            </a:r>
+            <a:r>
+              <a:rPr lang="nb-NO" dirty="0" err="1"/>
+              <a:t>tf</a:t>
+            </a:r>
+            <a:r>
+              <a:rPr lang="nb-NO" dirty="0"/>
+              <a:t> ran </a:t>
+            </a:r>
+            <a:r>
+              <a:rPr lang="nb-NO" dirty="0" err="1"/>
+              <a:t>things</a:t>
+            </a:r>
+            <a:r>
+              <a:rPr lang="nb-NO" dirty="0"/>
+              <a:t> in </a:t>
+            </a:r>
+            <a:r>
+              <a:rPr lang="nb-NO" dirty="0" err="1"/>
+              <a:t>parallel</a:t>
+            </a:r>
+            <a:r>
+              <a:rPr lang="nb-NO" dirty="0"/>
+              <a:t> </a:t>
+            </a:r>
+            <a:r>
+              <a:rPr lang="nb-NO" dirty="0" err="1"/>
+              <a:t>on</a:t>
+            </a:r>
+            <a:r>
+              <a:rPr lang="nb-NO" dirty="0"/>
+              <a:t> </a:t>
+            </a:r>
+            <a:r>
+              <a:rPr lang="nb-NO" dirty="0" err="1"/>
+              <a:t>the</a:t>
+            </a:r>
+            <a:r>
+              <a:rPr lang="nb-NO" dirty="0"/>
+              <a:t> laptop </a:t>
+            </a:r>
+            <a:r>
+              <a:rPr lang="nb-NO" dirty="0" err="1"/>
+              <a:t>graphics</a:t>
+            </a:r>
+            <a:r>
+              <a:rPr lang="nb-NO" dirty="0"/>
+              <a:t> </a:t>
+            </a:r>
+            <a:r>
+              <a:rPr lang="nb-NO" dirty="0" err="1"/>
+              <a:t>processor</a:t>
+            </a:r>
+            <a:r>
+              <a:rPr lang="nb-NO" dirty="0"/>
+              <a:t> (</a:t>
+            </a:r>
+            <a:r>
+              <a:rPr lang="nb-NO" dirty="0" err="1"/>
+              <a:t>much</a:t>
+            </a:r>
+            <a:r>
+              <a:rPr lang="nb-NO" dirty="0"/>
+              <a:t> </a:t>
+            </a:r>
+            <a:r>
+              <a:rPr lang="nb-NO" dirty="0" err="1"/>
+              <a:t>better</a:t>
+            </a:r>
+            <a:r>
+              <a:rPr lang="nb-NO" dirty="0"/>
+              <a:t> </a:t>
+            </a:r>
+            <a:r>
+              <a:rPr lang="nb-NO" dirty="0" err="1"/>
+              <a:t>parallel</a:t>
+            </a:r>
+            <a:r>
+              <a:rPr lang="nb-NO" dirty="0"/>
+              <a:t> 	</a:t>
+            </a:r>
+            <a:r>
+              <a:rPr lang="nb-NO" dirty="0" err="1"/>
+              <a:t>compute</a:t>
+            </a:r>
+            <a:r>
+              <a:rPr lang="nb-NO" dirty="0"/>
+              <a:t>)</a:t>
+            </a:r>
+            <a:endParaRPr lang="nb-NO" b="1" dirty="0"/>
+          </a:p>
+          <a:p>
+            <a:endParaRPr lang="en-GB" dirty="0"/>
+          </a:p>
+        </p:txBody>
+      </p:sp>
+    </p:spTree>
+    <p:extLst>
+      <p:ext uri="{BB962C8B-B14F-4D97-AF65-F5344CB8AC3E}">
+        <p14:creationId xmlns:p14="http://schemas.microsoft.com/office/powerpoint/2010/main" val="2749952209"/>
+      </p:ext>
+    </p:extLst>
+  </p:cSld>
+  <p:clrMapOvr>
+    <a:masterClrMapping/>
+  </p:clrMapOvr>
+</p:sld>
+</file>
+
+<file path=ppt/slides/slide5.xml><?xml version="1.0" encoding="utf-8"?>
+<p:sld xmlns:a="http://schemas.openxmlformats.org/drawingml/2006/main" xmlns:r="http://schemas.openxmlformats.org/officeDocument/2006/relationships" xmlns:p="http://schemas.openxmlformats.org/presentationml/2006/main">
+  <p:cSld>
+    <p:spTree>
+      <p:nvGrpSpPr>
+        <p:cNvPr id="1" name=""/>
+        <p:cNvGrpSpPr/>
+        <p:nvPr/>
+      </p:nvGrpSpPr>
+      <p:grpSpPr>
+        <a:xfrm>
+          <a:off x="0" y="0"/>
+          <a:ext cx="0" cy="0"/>
+          <a:chOff x="0" y="0"/>
+          <a:chExt cx="0" cy="0"/>
+        </a:xfrm>
+      </p:grpSpPr>
+      <p:sp>
+        <p:nvSpPr>
+          <p:cNvPr id="2" name="Title 1">
+            <a:extLst>
+              <a:ext uri="{FF2B5EF4-FFF2-40B4-BE49-F238E27FC236}">
                 <a16:creationId xmlns:a16="http://schemas.microsoft.com/office/drawing/2014/main" id="{0101512F-ECF0-4CDC-8C8D-1FE82858E1A7}"/>
               </a:ext>
             </a:extLst>
@@ -4831,7 +5247,7 @@
 </p:sld>
 </file>
 
-<file path=ppt/slides/slide5.xml><?xml version="1.0" encoding="utf-8"?>
+<file path=ppt/slides/slide6.xml><?xml version="1.0" encoding="utf-8"?>
 <p:sld xmlns:a="http://schemas.openxmlformats.org/drawingml/2006/main" xmlns:r="http://schemas.openxmlformats.org/officeDocument/2006/relationships" xmlns:p="http://schemas.openxmlformats.org/presentationml/2006/main">
   <p:cSld>
     <p:bg>
@@ -5419,7 +5835,7 @@
 </p:sld>
 </file>
 
-<file path=ppt/slides/slide6.xml><?xml version="1.0" encoding="utf-8"?>
+<file path=ppt/slides/slide7.xml><?xml version="1.0" encoding="utf-8"?>
 <p:sld xmlns:a="http://schemas.openxmlformats.org/drawingml/2006/main" xmlns:r="http://schemas.openxmlformats.org/officeDocument/2006/relationships" xmlns:p="http://schemas.openxmlformats.org/presentationml/2006/main">
   <p:cSld>
     <p:spTree>
@@ -5512,6 +5928,35 @@
               <a:rPr lang="nb-NO" sz="1800" dirty="0"/>
               <a:t> for Conv2D</a:t>
             </a:r>
+          </a:p>
+          <a:p>
+            <a:r>
+              <a:rPr lang="nb-NO" sz="1800" dirty="0"/>
+              <a:t>	</a:t>
+            </a:r>
+            <a:r>
+              <a:rPr lang="nb-NO" sz="1800" dirty="0" err="1"/>
+              <a:t>Discussion</a:t>
+            </a:r>
+            <a:r>
+              <a:rPr lang="nb-NO" sz="1800" dirty="0"/>
+              <a:t> </a:t>
+            </a:r>
+            <a:r>
+              <a:rPr lang="nb-NO" sz="1800" dirty="0" err="1"/>
+              <a:t>around</a:t>
+            </a:r>
+            <a:r>
+              <a:rPr lang="nb-NO" sz="1800" dirty="0"/>
+              <a:t> </a:t>
+            </a:r>
+            <a:r>
+              <a:rPr lang="nb-NO" sz="1800" dirty="0" err="1"/>
+              <a:t>this</a:t>
+            </a:r>
+            <a:endParaRPr lang="nb-NO" sz="1800" dirty="0"/>
+          </a:p>
+          <a:p>
             <a:endParaRPr lang="en-GB" sz="1800" dirty="0"/>
           </a:p>
         </p:txBody>

</xml_diff>

<commit_message>
Added some preliminary results to the meeting pp
</commit_message>
<xml_diff>
--- a/Meeting Presentations/06.10.2022_General_meeting.pptx
+++ b/Meeting Presentations/06.10.2022_General_meeting.pptx
@@ -13,7 +13,12 @@
     <p:sldId id="261" r:id="rId7"/>
     <p:sldId id="263" r:id="rId8"/>
     <p:sldId id="264" r:id="rId9"/>
-    <p:sldId id="260" r:id="rId10"/>
+    <p:sldId id="265" r:id="rId10"/>
+    <p:sldId id="266" r:id="rId11"/>
+    <p:sldId id="260" r:id="rId12"/>
+    <p:sldId id="268" r:id="rId13"/>
+    <p:sldId id="269" r:id="rId14"/>
+    <p:sldId id="267" r:id="rId15"/>
   </p:sldIdLst>
   <p:sldSz cx="12192000" cy="6858000"/>
   <p:notesSz cx="6858000" cy="9144000"/>
@@ -4179,6 +4184,955 @@
 </p:sld>
 </file>
 
+<file path=ppt/slides/slide10.xml><?xml version="1.0" encoding="utf-8"?>
+<p:sld xmlns:a="http://schemas.openxmlformats.org/drawingml/2006/main" xmlns:r="http://schemas.openxmlformats.org/officeDocument/2006/relationships" xmlns:p="http://schemas.openxmlformats.org/presentationml/2006/main">
+  <p:cSld>
+    <p:spTree>
+      <p:nvGrpSpPr>
+        <p:cNvPr id="1" name=""/>
+        <p:cNvGrpSpPr/>
+        <p:nvPr/>
+      </p:nvGrpSpPr>
+      <p:grpSpPr>
+        <a:xfrm>
+          <a:off x="0" y="0"/>
+          <a:ext cx="0" cy="0"/>
+          <a:chOff x="0" y="0"/>
+          <a:chExt cx="0" cy="0"/>
+        </a:xfrm>
+      </p:grpSpPr>
+      <p:sp>
+        <p:nvSpPr>
+          <p:cNvPr id="2" name="Title 1">
+            <a:extLst>
+              <a:ext uri="{FF2B5EF4-FFF2-40B4-BE49-F238E27FC236}">
+                <a16:creationId xmlns:a16="http://schemas.microsoft.com/office/drawing/2014/main" id="{2BA28547-6B73-4D3A-8DAD-DF16285C8781}"/>
+              </a:ext>
+            </a:extLst>
+          </p:cNvPr>
+          <p:cNvSpPr>
+            <a:spLocks noGrp="1"/>
+          </p:cNvSpPr>
+          <p:nvPr>
+            <p:ph type="title"/>
+          </p:nvPr>
+        </p:nvSpPr>
+        <p:spPr>
+          <a:xfrm>
+            <a:off x="517869" y="978408"/>
+            <a:ext cx="5407069" cy="4870457"/>
+          </a:xfrm>
+        </p:spPr>
+        <p:txBody>
+          <a:bodyPr>
+            <a:normAutofit/>
+          </a:bodyPr>
+          <a:lstStyle/>
+          <a:p>
+            <a:r>
+              <a:rPr lang="nb-NO" sz="3200" dirty="0"/>
+              <a:t>All </a:t>
+            </a:r>
+            <a:r>
+              <a:rPr lang="nb-NO" sz="3200" dirty="0" err="1"/>
+              <a:t>of</a:t>
+            </a:r>
+            <a:r>
+              <a:rPr lang="nb-NO" sz="3200" dirty="0"/>
+              <a:t> </a:t>
+            </a:r>
+            <a:r>
+              <a:rPr lang="nb-NO" sz="3200" dirty="0" err="1"/>
+              <a:t>this</a:t>
+            </a:r>
+            <a:r>
+              <a:rPr lang="nb-NO" sz="3200" dirty="0"/>
+              <a:t> is </a:t>
+            </a:r>
+            <a:r>
+              <a:rPr lang="nb-NO" sz="3200" dirty="0" err="1"/>
+              <a:t>before</a:t>
+            </a:r>
+            <a:r>
+              <a:rPr lang="nb-NO" sz="3200" dirty="0"/>
+              <a:t> </a:t>
+            </a:r>
+            <a:r>
+              <a:rPr lang="nb-NO" sz="3200" dirty="0" err="1"/>
+              <a:t>any</a:t>
+            </a:r>
+            <a:r>
+              <a:rPr lang="nb-NO" sz="3200" dirty="0"/>
+              <a:t> data </a:t>
+            </a:r>
+            <a:r>
+              <a:rPr lang="nb-NO" sz="3200" dirty="0" err="1"/>
+              <a:t>preperation</a:t>
+            </a:r>
+            <a:endParaRPr lang="en-GB" sz="3200" dirty="0"/>
+          </a:p>
+        </p:txBody>
+      </p:sp>
+      <p:sp>
+        <p:nvSpPr>
+          <p:cNvPr id="3" name="Content Placeholder 2">
+            <a:extLst>
+              <a:ext uri="{FF2B5EF4-FFF2-40B4-BE49-F238E27FC236}">
+                <a16:creationId xmlns:a16="http://schemas.microsoft.com/office/drawing/2014/main" id="{E682927D-D2D3-4865-89CC-D77207BFA761}"/>
+              </a:ext>
+            </a:extLst>
+          </p:cNvPr>
+          <p:cNvSpPr>
+            <a:spLocks noGrp="1"/>
+          </p:cNvSpPr>
+          <p:nvPr>
+            <p:ph idx="1"/>
+          </p:nvPr>
+        </p:nvSpPr>
+        <p:spPr/>
+        <p:txBody>
+          <a:bodyPr/>
+          <a:lstStyle/>
+          <a:p>
+            <a:r>
+              <a:rPr lang="nb-NO" dirty="0"/>
+              <a:t>Data prep </a:t>
+            </a:r>
+            <a:r>
+              <a:rPr lang="nb-NO" dirty="0" err="1"/>
+              <a:t>will</a:t>
+            </a:r>
+            <a:r>
+              <a:rPr lang="nb-NO" dirty="0"/>
+              <a:t> most </a:t>
+            </a:r>
+            <a:r>
+              <a:rPr lang="nb-NO" dirty="0" err="1"/>
+              <a:t>likely</a:t>
+            </a:r>
+            <a:r>
+              <a:rPr lang="nb-NO" dirty="0"/>
+              <a:t> </a:t>
+            </a:r>
+            <a:r>
+              <a:rPr lang="nb-NO" dirty="0" err="1"/>
+              <a:t>improve</a:t>
+            </a:r>
+            <a:r>
+              <a:rPr lang="nb-NO" dirty="0"/>
+              <a:t> </a:t>
+            </a:r>
+            <a:r>
+              <a:rPr lang="nb-NO" dirty="0" err="1"/>
+              <a:t>results</a:t>
+            </a:r>
+            <a:r>
+              <a:rPr lang="nb-NO" dirty="0"/>
+              <a:t>:</a:t>
+            </a:r>
+          </a:p>
+          <a:p>
+            <a:pPr marL="342900" indent="-342900">
+              <a:buFont typeface="Arial" panose="020B0604020202020204" pitchFamily="34" charset="0"/>
+              <a:buChar char="•"/>
+            </a:pPr>
+            <a:r>
+              <a:rPr lang="nb-NO" dirty="0" err="1"/>
+              <a:t>Removing</a:t>
+            </a:r>
+            <a:r>
+              <a:rPr lang="nb-NO" dirty="0"/>
+              <a:t> </a:t>
+            </a:r>
+            <a:r>
+              <a:rPr lang="nb-NO" dirty="0" err="1"/>
+              <a:t>outliers</a:t>
+            </a:r>
+            <a:endParaRPr lang="nb-NO" dirty="0"/>
+          </a:p>
+          <a:p>
+            <a:pPr marL="342900" indent="-342900">
+              <a:buFont typeface="Arial" panose="020B0604020202020204" pitchFamily="34" charset="0"/>
+              <a:buChar char="•"/>
+            </a:pPr>
+            <a:r>
+              <a:rPr lang="nb-NO" dirty="0" err="1"/>
+              <a:t>Normalizing</a:t>
+            </a:r>
+            <a:r>
+              <a:rPr lang="nb-NO" dirty="0"/>
+              <a:t> </a:t>
+            </a:r>
+            <a:r>
+              <a:rPr lang="nb-NO" dirty="0" err="1"/>
+              <a:t>the</a:t>
+            </a:r>
+            <a:r>
+              <a:rPr lang="nb-NO" dirty="0"/>
+              <a:t> data</a:t>
+            </a:r>
+          </a:p>
+          <a:p>
+            <a:pPr marL="342900" indent="-342900">
+              <a:buFont typeface="Arial" panose="020B0604020202020204" pitchFamily="34" charset="0"/>
+              <a:buChar char="•"/>
+            </a:pPr>
+            <a:endParaRPr lang="en-GB" dirty="0"/>
+          </a:p>
+        </p:txBody>
+      </p:sp>
+    </p:spTree>
+    <p:extLst>
+      <p:ext uri="{BB962C8B-B14F-4D97-AF65-F5344CB8AC3E}">
+        <p14:creationId xmlns:p14="http://schemas.microsoft.com/office/powerpoint/2010/main" val="4195134594"/>
+      </p:ext>
+    </p:extLst>
+  </p:cSld>
+  <p:clrMapOvr>
+    <a:masterClrMapping/>
+  </p:clrMapOvr>
+</p:sld>
+</file>
+
+<file path=ppt/slides/slide11.xml><?xml version="1.0" encoding="utf-8"?>
+<p:sld xmlns:a="http://schemas.openxmlformats.org/drawingml/2006/main" xmlns:r="http://schemas.openxmlformats.org/officeDocument/2006/relationships" xmlns:p="http://schemas.openxmlformats.org/presentationml/2006/main">
+  <p:cSld>
+    <p:spTree>
+      <p:nvGrpSpPr>
+        <p:cNvPr id="1" name=""/>
+        <p:cNvGrpSpPr/>
+        <p:nvPr/>
+      </p:nvGrpSpPr>
+      <p:grpSpPr>
+        <a:xfrm>
+          <a:off x="0" y="0"/>
+          <a:ext cx="0" cy="0"/>
+          <a:chOff x="0" y="0"/>
+          <a:chExt cx="0" cy="0"/>
+        </a:xfrm>
+      </p:grpSpPr>
+      <p:sp>
+        <p:nvSpPr>
+          <p:cNvPr id="2" name="Title 1">
+            <a:extLst>
+              <a:ext uri="{FF2B5EF4-FFF2-40B4-BE49-F238E27FC236}">
+                <a16:creationId xmlns:a16="http://schemas.microsoft.com/office/drawing/2014/main" id="{12258E73-6AE5-4223-B21E-5F34CFBE2733}"/>
+              </a:ext>
+            </a:extLst>
+          </p:cNvPr>
+          <p:cNvSpPr>
+            <a:spLocks noGrp="1"/>
+          </p:cNvSpPr>
+          <p:nvPr>
+            <p:ph type="title"/>
+          </p:nvPr>
+        </p:nvSpPr>
+        <p:spPr/>
+        <p:txBody>
+          <a:bodyPr/>
+          <a:lstStyle/>
+          <a:p>
+            <a:r>
+              <a:rPr lang="nb-NO" dirty="0" err="1"/>
+              <a:t>Misc</a:t>
+            </a:r>
+            <a:endParaRPr lang="en-GB" dirty="0"/>
+          </a:p>
+        </p:txBody>
+      </p:sp>
+      <p:sp>
+        <p:nvSpPr>
+          <p:cNvPr id="3" name="Content Placeholder 2">
+            <a:extLst>
+              <a:ext uri="{FF2B5EF4-FFF2-40B4-BE49-F238E27FC236}">
+                <a16:creationId xmlns:a16="http://schemas.microsoft.com/office/drawing/2014/main" id="{E9B0CAFF-4335-4587-B8AD-BD8918EA374C}"/>
+              </a:ext>
+            </a:extLst>
+          </p:cNvPr>
+          <p:cNvSpPr>
+            <a:spLocks noGrp="1"/>
+          </p:cNvSpPr>
+          <p:nvPr>
+            <p:ph idx="1"/>
+          </p:nvPr>
+        </p:nvSpPr>
+        <p:spPr/>
+        <p:txBody>
+          <a:bodyPr>
+            <a:normAutofit/>
+          </a:bodyPr>
+          <a:lstStyle/>
+          <a:p>
+            <a:r>
+              <a:rPr lang="nb-NO" sz="1800" dirty="0" err="1"/>
+              <a:t>Causal</a:t>
+            </a:r>
+            <a:r>
+              <a:rPr lang="nb-NO" sz="1800" dirty="0"/>
+              <a:t> </a:t>
+            </a:r>
+            <a:r>
+              <a:rPr lang="nb-NO" sz="1800" dirty="0" err="1"/>
+              <a:t>padding</a:t>
+            </a:r>
+            <a:r>
+              <a:rPr lang="nb-NO" sz="1800" dirty="0"/>
+              <a:t> is not </a:t>
+            </a:r>
+            <a:r>
+              <a:rPr lang="nb-NO" sz="1800" dirty="0" err="1"/>
+              <a:t>supported</a:t>
+            </a:r>
+            <a:r>
+              <a:rPr lang="nb-NO" sz="1800" dirty="0"/>
+              <a:t> for Conv2D</a:t>
+            </a:r>
+          </a:p>
+          <a:p>
+            <a:r>
+              <a:rPr lang="nb-NO" sz="1800" dirty="0"/>
+              <a:t>	</a:t>
+            </a:r>
+            <a:r>
+              <a:rPr lang="nb-NO" sz="1800" dirty="0" err="1"/>
+              <a:t>Discussion</a:t>
+            </a:r>
+            <a:r>
+              <a:rPr lang="nb-NO" sz="1800" dirty="0"/>
+              <a:t> </a:t>
+            </a:r>
+            <a:r>
+              <a:rPr lang="nb-NO" sz="1800" dirty="0" err="1"/>
+              <a:t>around</a:t>
+            </a:r>
+            <a:r>
+              <a:rPr lang="nb-NO" sz="1800" dirty="0"/>
+              <a:t> </a:t>
+            </a:r>
+            <a:r>
+              <a:rPr lang="nb-NO" sz="1800" dirty="0" err="1"/>
+              <a:t>this</a:t>
+            </a:r>
+            <a:endParaRPr lang="nb-NO" sz="1800" dirty="0"/>
+          </a:p>
+          <a:p>
+            <a:endParaRPr lang="en-GB" sz="1800" dirty="0"/>
+          </a:p>
+        </p:txBody>
+      </p:sp>
+    </p:spTree>
+    <p:extLst>
+      <p:ext uri="{BB962C8B-B14F-4D97-AF65-F5344CB8AC3E}">
+        <p14:creationId xmlns:p14="http://schemas.microsoft.com/office/powerpoint/2010/main" val="1721430244"/>
+      </p:ext>
+    </p:extLst>
+  </p:cSld>
+  <p:clrMapOvr>
+    <a:masterClrMapping/>
+  </p:clrMapOvr>
+</p:sld>
+</file>
+
+<file path=ppt/slides/slide12.xml><?xml version="1.0" encoding="utf-8"?>
+<p:sld xmlns:a="http://schemas.openxmlformats.org/drawingml/2006/main" xmlns:r="http://schemas.openxmlformats.org/officeDocument/2006/relationships" xmlns:p="http://schemas.openxmlformats.org/presentationml/2006/main">
+  <p:cSld>
+    <p:spTree>
+      <p:nvGrpSpPr>
+        <p:cNvPr id="1" name=""/>
+        <p:cNvGrpSpPr/>
+        <p:nvPr/>
+      </p:nvGrpSpPr>
+      <p:grpSpPr>
+        <a:xfrm>
+          <a:off x="0" y="0"/>
+          <a:ext cx="0" cy="0"/>
+          <a:chOff x="0" y="0"/>
+          <a:chExt cx="0" cy="0"/>
+        </a:xfrm>
+      </p:grpSpPr>
+      <p:sp>
+        <p:nvSpPr>
+          <p:cNvPr id="2" name="Title 1">
+            <a:extLst>
+              <a:ext uri="{FF2B5EF4-FFF2-40B4-BE49-F238E27FC236}">
+                <a16:creationId xmlns:a16="http://schemas.microsoft.com/office/drawing/2014/main" id="{363286B4-45A3-4D3F-89BA-B04DF59B6064}"/>
+              </a:ext>
+            </a:extLst>
+          </p:cNvPr>
+          <p:cNvSpPr>
+            <a:spLocks noGrp="1"/>
+          </p:cNvSpPr>
+          <p:nvPr>
+            <p:ph type="title"/>
+          </p:nvPr>
+        </p:nvSpPr>
+        <p:spPr/>
+        <p:txBody>
+          <a:bodyPr/>
+          <a:lstStyle/>
+          <a:p>
+            <a:r>
+              <a:rPr lang="nb-NO" dirty="0" err="1"/>
+              <a:t>Academics</a:t>
+            </a:r>
+            <a:r>
+              <a:rPr lang="nb-NO" dirty="0"/>
+              <a:t> and </a:t>
+            </a:r>
+            <a:r>
+              <a:rPr lang="nb-NO" dirty="0" err="1"/>
+              <a:t>writing</a:t>
+            </a:r>
+            <a:endParaRPr lang="en-GB" dirty="0"/>
+          </a:p>
+        </p:txBody>
+      </p:sp>
+      <p:sp>
+        <p:nvSpPr>
+          <p:cNvPr id="3" name="Content Placeholder 2">
+            <a:extLst>
+              <a:ext uri="{FF2B5EF4-FFF2-40B4-BE49-F238E27FC236}">
+                <a16:creationId xmlns:a16="http://schemas.microsoft.com/office/drawing/2014/main" id="{6EC674BB-1C03-4AE5-BBD2-85061154A891}"/>
+              </a:ext>
+            </a:extLst>
+          </p:cNvPr>
+          <p:cNvSpPr>
+            <a:spLocks noGrp="1"/>
+          </p:cNvSpPr>
+          <p:nvPr>
+            <p:ph idx="1"/>
+          </p:nvPr>
+        </p:nvSpPr>
+        <p:spPr/>
+        <p:txBody>
+          <a:bodyPr/>
+          <a:lstStyle/>
+          <a:p>
+            <a:r>
+              <a:rPr lang="nb-NO" dirty="0" err="1"/>
+              <a:t>I’m</a:t>
+            </a:r>
+            <a:r>
+              <a:rPr lang="nb-NO" dirty="0"/>
+              <a:t> </a:t>
+            </a:r>
+            <a:r>
+              <a:rPr lang="nb-NO" dirty="0" err="1"/>
+              <a:t>collecting</a:t>
+            </a:r>
+            <a:r>
+              <a:rPr lang="nb-NO" dirty="0"/>
+              <a:t> </a:t>
+            </a:r>
+            <a:r>
+              <a:rPr lang="nb-NO" dirty="0" err="1"/>
+              <a:t>good</a:t>
+            </a:r>
+            <a:r>
+              <a:rPr lang="nb-NO" dirty="0"/>
+              <a:t> </a:t>
+            </a:r>
+            <a:r>
+              <a:rPr lang="nb-NO" dirty="0" err="1"/>
+              <a:t>sources</a:t>
+            </a:r>
+            <a:r>
+              <a:rPr lang="nb-NO" dirty="0"/>
+              <a:t>, and </a:t>
+            </a:r>
+            <a:r>
+              <a:rPr lang="nb-NO" dirty="0" err="1"/>
+              <a:t>outlining</a:t>
+            </a:r>
+            <a:r>
+              <a:rPr lang="nb-NO" dirty="0"/>
+              <a:t> </a:t>
+            </a:r>
+            <a:r>
+              <a:rPr lang="nb-NO" dirty="0" err="1"/>
+              <a:t>the</a:t>
+            </a:r>
+            <a:r>
+              <a:rPr lang="nb-NO" dirty="0"/>
+              <a:t> </a:t>
+            </a:r>
+            <a:r>
+              <a:rPr lang="nb-NO" dirty="0" err="1"/>
+              <a:t>structure</a:t>
+            </a:r>
+            <a:r>
+              <a:rPr lang="nb-NO" dirty="0"/>
+              <a:t> </a:t>
+            </a:r>
+            <a:r>
+              <a:rPr lang="nb-NO" dirty="0" err="1"/>
+              <a:t>of</a:t>
+            </a:r>
+            <a:r>
+              <a:rPr lang="nb-NO" dirty="0"/>
+              <a:t> </a:t>
+            </a:r>
+            <a:r>
+              <a:rPr lang="nb-NO" dirty="0" err="1"/>
+              <a:t>what</a:t>
+            </a:r>
+            <a:r>
+              <a:rPr lang="nb-NO" dirty="0"/>
+              <a:t> is to be </a:t>
+            </a:r>
+            <a:r>
+              <a:rPr lang="nb-NO" dirty="0" err="1"/>
+              <a:t>written</a:t>
+            </a:r>
+            <a:r>
+              <a:rPr lang="nb-NO" dirty="0"/>
+              <a:t>. </a:t>
+            </a:r>
+            <a:r>
+              <a:rPr lang="nb-NO" dirty="0" err="1"/>
+              <a:t>I’m</a:t>
+            </a:r>
+            <a:r>
+              <a:rPr lang="nb-NO" dirty="0"/>
+              <a:t> planning to </a:t>
+            </a:r>
+            <a:r>
+              <a:rPr lang="nb-NO" dirty="0" err="1"/>
+              <a:t>get</a:t>
+            </a:r>
+            <a:r>
+              <a:rPr lang="nb-NO" dirty="0"/>
+              <a:t> a lot </a:t>
+            </a:r>
+            <a:r>
+              <a:rPr lang="nb-NO" dirty="0" err="1"/>
+              <a:t>of</a:t>
+            </a:r>
+            <a:r>
+              <a:rPr lang="nb-NO" dirty="0"/>
+              <a:t> </a:t>
+            </a:r>
+            <a:r>
+              <a:rPr lang="nb-NO" dirty="0" err="1"/>
+              <a:t>writing</a:t>
+            </a:r>
+            <a:r>
+              <a:rPr lang="nb-NO" dirty="0"/>
+              <a:t> in </a:t>
+            </a:r>
+            <a:r>
+              <a:rPr lang="nb-NO" dirty="0" err="1"/>
+              <a:t>while</a:t>
+            </a:r>
+            <a:r>
+              <a:rPr lang="nb-NO" dirty="0"/>
+              <a:t> </a:t>
+            </a:r>
+            <a:r>
+              <a:rPr lang="nb-NO" dirty="0" err="1"/>
+              <a:t>the</a:t>
+            </a:r>
+            <a:r>
+              <a:rPr lang="nb-NO" dirty="0"/>
+              <a:t> </a:t>
+            </a:r>
+            <a:r>
+              <a:rPr lang="nb-NO" dirty="0" err="1"/>
+              <a:t>models</a:t>
+            </a:r>
+            <a:r>
+              <a:rPr lang="nb-NO" dirty="0"/>
+              <a:t> </a:t>
+            </a:r>
+            <a:r>
+              <a:rPr lang="nb-NO" dirty="0" err="1"/>
+              <a:t>are</a:t>
+            </a:r>
+            <a:r>
+              <a:rPr lang="nb-NO" dirty="0"/>
+              <a:t> </a:t>
+            </a:r>
+            <a:r>
+              <a:rPr lang="nb-NO" dirty="0" err="1"/>
+              <a:t>running</a:t>
+            </a:r>
+            <a:endParaRPr lang="nb-NO" dirty="0"/>
+          </a:p>
+          <a:p>
+            <a:endParaRPr lang="en-GB" dirty="0"/>
+          </a:p>
+        </p:txBody>
+      </p:sp>
+    </p:spTree>
+    <p:extLst>
+      <p:ext uri="{BB962C8B-B14F-4D97-AF65-F5344CB8AC3E}">
+        <p14:creationId xmlns:p14="http://schemas.microsoft.com/office/powerpoint/2010/main" val="2162221258"/>
+      </p:ext>
+    </p:extLst>
+  </p:cSld>
+  <p:clrMapOvr>
+    <a:masterClrMapping/>
+  </p:clrMapOvr>
+</p:sld>
+</file>
+
+<file path=ppt/slides/slide13.xml><?xml version="1.0" encoding="utf-8"?>
+<p:sld xmlns:a="http://schemas.openxmlformats.org/drawingml/2006/main" xmlns:r="http://schemas.openxmlformats.org/officeDocument/2006/relationships" xmlns:p="http://schemas.openxmlformats.org/presentationml/2006/main">
+  <p:cSld>
+    <p:spTree>
+      <p:nvGrpSpPr>
+        <p:cNvPr id="1" name=""/>
+        <p:cNvGrpSpPr/>
+        <p:nvPr/>
+      </p:nvGrpSpPr>
+      <p:grpSpPr>
+        <a:xfrm>
+          <a:off x="0" y="0"/>
+          <a:ext cx="0" cy="0"/>
+          <a:chOff x="0" y="0"/>
+          <a:chExt cx="0" cy="0"/>
+        </a:xfrm>
+      </p:grpSpPr>
+      <p:sp>
+        <p:nvSpPr>
+          <p:cNvPr id="2" name="Title 1">
+            <a:extLst>
+              <a:ext uri="{FF2B5EF4-FFF2-40B4-BE49-F238E27FC236}">
+                <a16:creationId xmlns:a16="http://schemas.microsoft.com/office/drawing/2014/main" id="{B37ED228-9C48-40A4-A83C-2079A15261D4}"/>
+              </a:ext>
+            </a:extLst>
+          </p:cNvPr>
+          <p:cNvSpPr>
+            <a:spLocks noGrp="1"/>
+          </p:cNvSpPr>
+          <p:nvPr>
+            <p:ph type="title"/>
+          </p:nvPr>
+        </p:nvSpPr>
+        <p:spPr/>
+        <p:txBody>
+          <a:bodyPr/>
+          <a:lstStyle/>
+          <a:p>
+            <a:r>
+              <a:rPr lang="nb-NO" dirty="0"/>
+              <a:t>Hardware</a:t>
+            </a:r>
+            <a:endParaRPr lang="en-GB" dirty="0"/>
+          </a:p>
+        </p:txBody>
+      </p:sp>
+      <p:sp>
+        <p:nvSpPr>
+          <p:cNvPr id="3" name="Content Placeholder 2">
+            <a:extLst>
+              <a:ext uri="{FF2B5EF4-FFF2-40B4-BE49-F238E27FC236}">
+                <a16:creationId xmlns:a16="http://schemas.microsoft.com/office/drawing/2014/main" id="{42851050-1CC1-4665-A21A-967FA74D6E79}"/>
+              </a:ext>
+            </a:extLst>
+          </p:cNvPr>
+          <p:cNvSpPr>
+            <a:spLocks noGrp="1"/>
+          </p:cNvSpPr>
+          <p:nvPr>
+            <p:ph idx="1"/>
+          </p:nvPr>
+        </p:nvSpPr>
+        <p:spPr/>
+        <p:txBody>
+          <a:bodyPr/>
+          <a:lstStyle/>
+          <a:p>
+            <a:pPr marL="342900" indent="-342900">
+              <a:buFont typeface="Arial" panose="020B0604020202020204" pitchFamily="34" charset="0"/>
+              <a:buChar char="•"/>
+            </a:pPr>
+            <a:r>
+              <a:rPr lang="nb-NO" dirty="0"/>
+              <a:t>More GPU </a:t>
+            </a:r>
+            <a:r>
+              <a:rPr lang="nb-NO" dirty="0" err="1"/>
+              <a:t>power</a:t>
+            </a:r>
+            <a:endParaRPr lang="nb-NO" dirty="0"/>
+          </a:p>
+          <a:p>
+            <a:pPr marL="617220" lvl="1" indent="-342900"/>
+            <a:r>
+              <a:rPr lang="nb-NO" dirty="0" err="1"/>
+              <a:t>Having</a:t>
+            </a:r>
+            <a:r>
+              <a:rPr lang="nb-NO" dirty="0"/>
+              <a:t> a GPU </a:t>
+            </a:r>
+            <a:r>
+              <a:rPr lang="nb-NO" dirty="0" err="1"/>
+              <a:t>hooked</a:t>
+            </a:r>
+            <a:r>
+              <a:rPr lang="nb-NO" dirty="0"/>
+              <a:t> up to my NGI laptop </a:t>
+            </a:r>
+            <a:r>
+              <a:rPr lang="nb-NO" dirty="0" err="1"/>
+              <a:t>would</a:t>
+            </a:r>
+            <a:r>
+              <a:rPr lang="nb-NO" dirty="0"/>
+              <a:t> </a:t>
+            </a:r>
+            <a:r>
+              <a:rPr lang="nb-NO" dirty="0" err="1"/>
+              <a:t>drastically</a:t>
+            </a:r>
+            <a:r>
+              <a:rPr lang="nb-NO" dirty="0"/>
+              <a:t> speed up training time</a:t>
+            </a:r>
+          </a:p>
+          <a:p>
+            <a:pPr marL="617220" lvl="2" indent="-342900">
+              <a:buFont typeface="Arial" panose="020B0604020202020204" pitchFamily="34" charset="0"/>
+              <a:buChar char="•"/>
+            </a:pPr>
+            <a:r>
+              <a:rPr lang="nb-NO" dirty="0"/>
+              <a:t>	CPU vs. GPU </a:t>
+            </a:r>
+            <a:r>
+              <a:rPr lang="nb-NO" dirty="0" err="1"/>
+              <a:t>wrt</a:t>
+            </a:r>
+            <a:r>
+              <a:rPr lang="nb-NO" dirty="0"/>
+              <a:t>. Odin</a:t>
+            </a:r>
+          </a:p>
+          <a:p>
+            <a:pPr marL="617220" lvl="2" indent="-342900">
+              <a:buFont typeface="Arial" panose="020B0604020202020204" pitchFamily="34" charset="0"/>
+              <a:buChar char="•"/>
+            </a:pPr>
+            <a:r>
+              <a:rPr lang="nb-NO" dirty="0" err="1"/>
+              <a:t>Azure</a:t>
+            </a:r>
+            <a:r>
+              <a:rPr lang="nb-NO" dirty="0"/>
+              <a:t> </a:t>
+            </a:r>
+            <a:r>
+              <a:rPr lang="nb-NO" dirty="0" err="1"/>
+              <a:t>cluster</a:t>
+            </a:r>
+            <a:endParaRPr lang="nb-NO" dirty="0"/>
+          </a:p>
+          <a:p>
+            <a:pPr marL="617220" lvl="2" indent="-342900">
+              <a:buFont typeface="Arial" panose="020B0604020202020204" pitchFamily="34" charset="0"/>
+              <a:buChar char="•"/>
+            </a:pPr>
+            <a:r>
+              <a:rPr lang="nb-NO" dirty="0"/>
+              <a:t>Amazon Web services</a:t>
+            </a:r>
+          </a:p>
+          <a:p>
+            <a:pPr marL="342900" indent="-342900">
+              <a:buFont typeface="Arial" panose="020B0604020202020204" pitchFamily="34" charset="0"/>
+              <a:buChar char="•"/>
+            </a:pPr>
+            <a:r>
+              <a:rPr lang="nb-NO"/>
+              <a:t>$$$</a:t>
+            </a:r>
+            <a:endParaRPr lang="en-GB" dirty="0"/>
+          </a:p>
+        </p:txBody>
+      </p:sp>
+    </p:spTree>
+    <p:extLst>
+      <p:ext uri="{BB962C8B-B14F-4D97-AF65-F5344CB8AC3E}">
+        <p14:creationId xmlns:p14="http://schemas.microsoft.com/office/powerpoint/2010/main" val="1337664835"/>
+      </p:ext>
+    </p:extLst>
+  </p:cSld>
+  <p:clrMapOvr>
+    <a:masterClrMapping/>
+  </p:clrMapOvr>
+</p:sld>
+</file>
+
+<file path=ppt/slides/slide14.xml><?xml version="1.0" encoding="utf-8"?>
+<p:sld xmlns:a="http://schemas.openxmlformats.org/drawingml/2006/main" xmlns:r="http://schemas.openxmlformats.org/officeDocument/2006/relationships" xmlns:p="http://schemas.openxmlformats.org/presentationml/2006/main">
+  <p:cSld>
+    <p:spTree>
+      <p:nvGrpSpPr>
+        <p:cNvPr id="1" name=""/>
+        <p:cNvGrpSpPr/>
+        <p:nvPr/>
+      </p:nvGrpSpPr>
+      <p:grpSpPr>
+        <a:xfrm>
+          <a:off x="0" y="0"/>
+          <a:ext cx="0" cy="0"/>
+          <a:chOff x="0" y="0"/>
+          <a:chExt cx="0" cy="0"/>
+        </a:xfrm>
+      </p:grpSpPr>
+      <p:sp>
+        <p:nvSpPr>
+          <p:cNvPr id="2" name="Title 1">
+            <a:extLst>
+              <a:ext uri="{FF2B5EF4-FFF2-40B4-BE49-F238E27FC236}">
+                <a16:creationId xmlns:a16="http://schemas.microsoft.com/office/drawing/2014/main" id="{DEF99137-97F8-4282-9F98-0512E8783DC1}"/>
+              </a:ext>
+            </a:extLst>
+          </p:cNvPr>
+          <p:cNvSpPr>
+            <a:spLocks noGrp="1"/>
+          </p:cNvSpPr>
+          <p:nvPr>
+            <p:ph type="title"/>
+          </p:nvPr>
+        </p:nvSpPr>
+        <p:spPr/>
+        <p:txBody>
+          <a:bodyPr/>
+          <a:lstStyle/>
+          <a:p>
+            <a:r>
+              <a:rPr lang="nb-NO" dirty="0" err="1"/>
+              <a:t>Next</a:t>
+            </a:r>
+            <a:r>
+              <a:rPr lang="nb-NO" dirty="0"/>
+              <a:t> </a:t>
+            </a:r>
+            <a:r>
+              <a:rPr lang="nb-NO" dirty="0" err="1"/>
+              <a:t>meeting</a:t>
+            </a:r>
+            <a:endParaRPr lang="en-GB" dirty="0"/>
+          </a:p>
+        </p:txBody>
+      </p:sp>
+      <p:sp>
+        <p:nvSpPr>
+          <p:cNvPr id="3" name="Content Placeholder 2">
+            <a:extLst>
+              <a:ext uri="{FF2B5EF4-FFF2-40B4-BE49-F238E27FC236}">
+                <a16:creationId xmlns:a16="http://schemas.microsoft.com/office/drawing/2014/main" id="{04F8BE0E-A5DA-4637-AF1D-4388A318D899}"/>
+              </a:ext>
+            </a:extLst>
+          </p:cNvPr>
+          <p:cNvSpPr>
+            <a:spLocks noGrp="1"/>
+          </p:cNvSpPr>
+          <p:nvPr>
+            <p:ph idx="1"/>
+          </p:nvPr>
+        </p:nvSpPr>
+        <p:spPr>
+          <a:xfrm>
+            <a:off x="6096000" y="969264"/>
+            <a:ext cx="5587350" cy="4870457"/>
+          </a:xfrm>
+        </p:spPr>
+        <p:txBody>
+          <a:bodyPr/>
+          <a:lstStyle/>
+          <a:p>
+            <a:r>
+              <a:rPr lang="nb-NO" dirty="0"/>
+              <a:t>13.10.2022: </a:t>
+            </a:r>
+            <a:r>
+              <a:rPr lang="nb-NO" dirty="0" err="1"/>
+              <a:t>Geotechnics</a:t>
+            </a:r>
+            <a:r>
+              <a:rPr lang="nb-NO" dirty="0"/>
+              <a:t> &amp; </a:t>
+            </a:r>
+            <a:r>
+              <a:rPr lang="nb-NO" dirty="0" err="1"/>
+              <a:t>geophysics</a:t>
+            </a:r>
+            <a:r>
+              <a:rPr lang="nb-NO" dirty="0"/>
+              <a:t> </a:t>
+            </a:r>
+            <a:r>
+              <a:rPr lang="nb-NO" dirty="0" err="1"/>
+              <a:t>meeting</a:t>
+            </a:r>
+            <a:endParaRPr lang="nb-NO" dirty="0"/>
+          </a:p>
+          <a:p>
+            <a:r>
+              <a:rPr lang="en-GB" dirty="0"/>
+              <a:t>Topics of discussion: </a:t>
+            </a:r>
+          </a:p>
+          <a:p>
+            <a:pPr marL="342900" indent="-342900">
+              <a:buFont typeface="Arial" panose="020B0604020202020204" pitchFamily="34" charset="0"/>
+              <a:buChar char="•"/>
+            </a:pPr>
+            <a:r>
+              <a:rPr lang="en-GB" dirty="0"/>
+              <a:t>Parameters for prediction</a:t>
+            </a:r>
+          </a:p>
+          <a:p>
+            <a:pPr marL="342900" indent="-342900">
+              <a:buFont typeface="Arial" panose="020B0604020202020204" pitchFamily="34" charset="0"/>
+              <a:buChar char="•"/>
+            </a:pPr>
+            <a:r>
+              <a:rPr lang="en-GB" dirty="0"/>
+              <a:t>Data treatment</a:t>
+            </a:r>
+          </a:p>
+          <a:p>
+            <a:pPr marL="342900" indent="-342900">
+              <a:buFont typeface="Arial" panose="020B0604020202020204" pitchFamily="34" charset="0"/>
+              <a:buChar char="•"/>
+            </a:pPr>
+            <a:r>
+              <a:rPr lang="en-GB" dirty="0"/>
+              <a:t>Good sources</a:t>
+            </a:r>
+          </a:p>
+          <a:p>
+            <a:pPr marL="342900" indent="-342900">
+              <a:buFont typeface="Arial" panose="020B0604020202020204" pitchFamily="34" charset="0"/>
+              <a:buChar char="•"/>
+            </a:pPr>
+            <a:r>
+              <a:rPr lang="en-GB" dirty="0"/>
+              <a:t>etc..</a:t>
+            </a:r>
+            <a:endParaRPr lang="nb-NO" dirty="0"/>
+          </a:p>
+        </p:txBody>
+      </p:sp>
+    </p:spTree>
+    <p:extLst>
+      <p:ext uri="{BB962C8B-B14F-4D97-AF65-F5344CB8AC3E}">
+        <p14:creationId xmlns:p14="http://schemas.microsoft.com/office/powerpoint/2010/main" val="3390131743"/>
+      </p:ext>
+    </p:extLst>
+  </p:cSld>
+  <p:clrMapOvr>
+    <a:masterClrMapping/>
+  </p:clrMapOvr>
+</p:sld>
+</file>
+
 <file path=ppt/slides/slide2.xml><?xml version="1.0" encoding="utf-8"?>
 <p:sld xmlns:a="http://schemas.openxmlformats.org/drawingml/2006/main" xmlns:r="http://schemas.openxmlformats.org/officeDocument/2006/relationships" xmlns:p="http://schemas.openxmlformats.org/presentationml/2006/main">
   <p:cSld>
@@ -5792,15 +6746,7 @@
             </a:r>
             <a:r>
               <a:rPr lang="nb-NO" dirty="0" err="1"/>
-              <a:t>throw</a:t>
-            </a:r>
-            <a:r>
-              <a:rPr lang="nb-NO" dirty="0"/>
-              <a:t> </a:t>
-            </a:r>
-            <a:r>
-              <a:rPr lang="nb-NO" dirty="0" err="1"/>
-              <a:t>off</a:t>
+              <a:t>distract</a:t>
             </a:r>
             <a:r>
               <a:rPr lang="nb-NO" dirty="0"/>
@@ -5957,7 +6903,7 @@
         </p:blipFill>
         <p:spPr>
           <a:xfrm>
-            <a:off x="6453675" y="512624"/>
+            <a:off x="8005638" y="445512"/>
             <a:ext cx="3787548" cy="2843504"/>
           </a:xfrm>
         </p:spPr>
@@ -5990,7 +6936,7 @@
         </p:blipFill>
         <p:spPr>
           <a:xfrm>
-            <a:off x="6453675" y="3601226"/>
+            <a:off x="8005638" y="3534114"/>
             <a:ext cx="3787548" cy="2843505"/>
           </a:xfrm>
           <a:prstGeom prst="rect">
@@ -6242,6 +7188,36 @@
           </a:p>
         </p:txBody>
       </p:sp>
+      <p:pic>
+        <p:nvPicPr>
+          <p:cNvPr id="9" name="Picture 8">
+            <a:extLst>
+              <a:ext uri="{FF2B5EF4-FFF2-40B4-BE49-F238E27FC236}">
+                <a16:creationId xmlns:a16="http://schemas.microsoft.com/office/drawing/2014/main" id="{4266D97D-A5C4-4AFD-8552-1412AEF406F4}"/>
+              </a:ext>
+            </a:extLst>
+          </p:cNvPr>
+          <p:cNvPicPr>
+            <a:picLocks noChangeAspect="1"/>
+          </p:cNvPicPr>
+          <p:nvPr/>
+        </p:nvPicPr>
+        <p:blipFill>
+          <a:blip r:embed="rId4"/>
+          <a:stretch>
+            <a:fillRect/>
+          </a:stretch>
+        </p:blipFill>
+        <p:spPr>
+          <a:xfrm>
+            <a:off x="6622690" y="2851513"/>
+            <a:ext cx="1261981" cy="3621338"/>
+          </a:xfrm>
+          <a:prstGeom prst="rect">
+            <a:avLst/>
+          </a:prstGeom>
+        </p:spPr>
+      </p:pic>
     </p:spTree>
     <p:extLst>
       <p:ext uri="{BB962C8B-B14F-4D97-AF65-F5344CB8AC3E}">
@@ -6340,7 +7316,7 @@
         </p:blipFill>
         <p:spPr>
           <a:xfrm>
-            <a:off x="6494787" y="496192"/>
+            <a:off x="7945353" y="445858"/>
             <a:ext cx="3728777" cy="2799382"/>
           </a:xfrm>
         </p:spPr>
@@ -6373,7 +7349,7 @@
         </p:blipFill>
         <p:spPr>
           <a:xfrm>
-            <a:off x="6494789" y="3665064"/>
+            <a:off x="7945355" y="3614730"/>
             <a:ext cx="3728775" cy="2799381"/>
           </a:xfrm>
           <a:prstGeom prst="rect">
@@ -6395,8 +7371,8 @@
         </p:nvSpPr>
         <p:spPr>
           <a:xfrm>
-            <a:off x="517870" y="2118050"/>
-            <a:ext cx="5179341" cy="3139321"/>
+            <a:off x="517869" y="2118050"/>
+            <a:ext cx="6016175" cy="3139321"/>
           </a:xfrm>
           <a:prstGeom prst="rect">
             <a:avLst/>
@@ -6454,27 +7430,27 @@
               <a:t> </a:t>
             </a:r>
             <a:r>
-              <a:rPr lang="nb-NO" dirty="0" err="1"/>
+              <a:rPr lang="nb-NO" b="1" dirty="0" err="1"/>
               <a:t>ocean</a:t>
             </a:r>
             <a:r>
-              <a:rPr lang="nb-NO" dirty="0"/>
-              <a:t> </a:t>
-            </a:r>
-            <a:r>
-              <a:rPr lang="nb-NO" dirty="0" err="1"/>
+              <a:rPr lang="nb-NO" b="1" dirty="0"/>
+              <a:t> </a:t>
+            </a:r>
+            <a:r>
+              <a:rPr lang="nb-NO" b="1" dirty="0" err="1"/>
               <a:t>bottom</a:t>
             </a:r>
             <a:r>
-              <a:rPr lang="nb-NO" dirty="0"/>
-              <a:t> </a:t>
-            </a:r>
-            <a:r>
-              <a:rPr lang="nb-NO" dirty="0" err="1"/>
+              <a:rPr lang="nb-NO" b="1" dirty="0"/>
+              <a:t> </a:t>
+            </a:r>
+            <a:r>
+              <a:rPr lang="nb-NO" b="1" dirty="0" err="1"/>
               <a:t>reflector</a:t>
             </a:r>
             <a:r>
-              <a:rPr lang="nb-NO" dirty="0"/>
+              <a:rPr lang="nb-NO" b="1" dirty="0"/>
               <a:t> </a:t>
             </a:r>
             <a:r>
@@ -6573,6 +7549,80 @@
               <a:rPr lang="en-GB" dirty="0"/>
               <a:t>Loss = 1.28</a:t>
             </a:r>
+          </a:p>
+        </p:txBody>
+      </p:sp>
+      <p:sp>
+        <p:nvSpPr>
+          <p:cNvPr id="9" name="TextBox 8">
+            <a:extLst>
+              <a:ext uri="{FF2B5EF4-FFF2-40B4-BE49-F238E27FC236}">
+                <a16:creationId xmlns:a16="http://schemas.microsoft.com/office/drawing/2014/main" id="{ECEC4A22-A1B3-40C4-9970-2B95DA8A4E2A}"/>
+              </a:ext>
+            </a:extLst>
+          </p:cNvPr>
+          <p:cNvSpPr txBox="1"/>
+          <p:nvPr/>
+        </p:nvSpPr>
+        <p:spPr>
+          <a:xfrm>
+            <a:off x="6610525" y="2875908"/>
+            <a:ext cx="1258348" cy="369332"/>
+          </a:xfrm>
+          <a:prstGeom prst="rect">
+            <a:avLst/>
+          </a:prstGeom>
+          <a:noFill/>
+        </p:spPr>
+        <p:txBody>
+          <a:bodyPr wrap="square" rtlCol="0">
+            <a:spAutoFit/>
+          </a:bodyPr>
+          <a:lstStyle/>
+          <a:p>
+            <a:pPr algn="ctr"/>
+            <a:r>
+              <a:rPr lang="nb-NO" dirty="0" err="1"/>
+              <a:t>Predicted</a:t>
+            </a:r>
+            <a:endParaRPr lang="en-GB" dirty="0"/>
+          </a:p>
+        </p:txBody>
+      </p:sp>
+      <p:sp>
+        <p:nvSpPr>
+          <p:cNvPr id="10" name="TextBox 9">
+            <a:extLst>
+              <a:ext uri="{FF2B5EF4-FFF2-40B4-BE49-F238E27FC236}">
+                <a16:creationId xmlns:a16="http://schemas.microsoft.com/office/drawing/2014/main" id="{9A3B85A9-FC18-4394-ADEC-47CF69CAF029}"/>
+              </a:ext>
+            </a:extLst>
+          </p:cNvPr>
+          <p:cNvSpPr txBox="1"/>
+          <p:nvPr/>
+        </p:nvSpPr>
+        <p:spPr>
+          <a:xfrm>
+            <a:off x="6610524" y="5998127"/>
+            <a:ext cx="1258349" cy="369332"/>
+          </a:xfrm>
+          <a:prstGeom prst="rect">
+            <a:avLst/>
+          </a:prstGeom>
+          <a:noFill/>
+        </p:spPr>
+        <p:txBody>
+          <a:bodyPr wrap="square" rtlCol="0">
+            <a:spAutoFit/>
+          </a:bodyPr>
+          <a:lstStyle/>
+          <a:p>
+            <a:pPr algn="ctr"/>
+            <a:r>
+              <a:rPr lang="nb-NO" dirty="0"/>
+              <a:t>True</a:t>
+            </a:r>
+            <a:endParaRPr lang="en-GB" dirty="0"/>
           </a:p>
         </p:txBody>
       </p:sp>
@@ -6611,7 +7661,7 @@
           <p:cNvPr id="2" name="Title 1">
             <a:extLst>
               <a:ext uri="{FF2B5EF4-FFF2-40B4-BE49-F238E27FC236}">
-                <a16:creationId xmlns:a16="http://schemas.microsoft.com/office/drawing/2014/main" id="{12258E73-6AE5-4223-B21E-5F34CFBE2733}"/>
+                <a16:creationId xmlns:a16="http://schemas.microsoft.com/office/drawing/2014/main" id="{C9519876-F2DB-498A-895D-DC823225655D}"/>
               </a:ext>
             </a:extLst>
           </p:cNvPr>
@@ -6622,103 +7672,282 @@
             <p:ph type="title"/>
           </p:nvPr>
         </p:nvSpPr>
-        <p:spPr/>
+        <p:spPr>
+          <a:xfrm>
+            <a:off x="517870" y="978409"/>
+            <a:ext cx="5021182" cy="1578180"/>
+          </a:xfrm>
+        </p:spPr>
         <p:txBody>
           <a:bodyPr/>
           <a:lstStyle/>
           <a:p>
             <a:r>
               <a:rPr lang="nb-NO" dirty="0" err="1"/>
-              <a:t>Misc</a:t>
+              <a:t>Optuna</a:t>
             </a:r>
             <a:endParaRPr lang="en-GB" dirty="0"/>
           </a:p>
         </p:txBody>
       </p:sp>
-      <p:sp>
-        <p:nvSpPr>
-          <p:cNvPr id="3" name="Content Placeholder 2">
-            <a:extLst>
-              <a:ext uri="{FF2B5EF4-FFF2-40B4-BE49-F238E27FC236}">
-                <a16:creationId xmlns:a16="http://schemas.microsoft.com/office/drawing/2014/main" id="{E9B0CAFF-4335-4587-B8AD-BD8918EA374C}"/>
-              </a:ext>
-            </a:extLst>
-          </p:cNvPr>
-          <p:cNvSpPr>
-            <a:spLocks noGrp="1"/>
-          </p:cNvSpPr>
+      <p:pic>
+        <p:nvPicPr>
+          <p:cNvPr id="5" name="Content Placeholder 4" descr="A computer screen capture&#10;&#10;Description automatically generated with medium confidence">
+            <a:extLst>
+              <a:ext uri="{FF2B5EF4-FFF2-40B4-BE49-F238E27FC236}">
+                <a16:creationId xmlns:a16="http://schemas.microsoft.com/office/drawing/2014/main" id="{21E03888-DF5E-4193-9BDB-B79BCEFA01F1}"/>
+              </a:ext>
+            </a:extLst>
+          </p:cNvPr>
+          <p:cNvPicPr>
+            <a:picLocks noGrp="1" noChangeAspect="1"/>
+          </p:cNvPicPr>
           <p:nvPr>
             <p:ph idx="1"/>
           </p:nvPr>
-        </p:nvSpPr>
-        <p:spPr/>
-        <p:txBody>
-          <a:bodyPr>
-            <a:normAutofit/>
+        </p:nvPicPr>
+        <p:blipFill>
+          <a:blip r:embed="rId2">
+            <a:extLst>
+              <a:ext uri="{28A0092B-C50C-407E-A947-70E740481C1C}">
+                <a14:useLocalDpi xmlns:a14="http://schemas.microsoft.com/office/drawing/2010/main" val="0"/>
+              </a:ext>
+            </a:extLst>
+          </a:blip>
+          <a:stretch>
+            <a:fillRect/>
+          </a:stretch>
+        </p:blipFill>
+        <p:spPr>
+          <a:xfrm>
+            <a:off x="7945353" y="445858"/>
+            <a:ext cx="3728777" cy="2799382"/>
+          </a:xfrm>
+        </p:spPr>
+      </p:pic>
+      <p:pic>
+        <p:nvPicPr>
+          <p:cNvPr id="7" name="Picture 6" descr="A field of red flowers&#10;&#10;Description automatically generated with medium confidence">
+            <a:extLst>
+              <a:ext uri="{FF2B5EF4-FFF2-40B4-BE49-F238E27FC236}">
+                <a16:creationId xmlns:a16="http://schemas.microsoft.com/office/drawing/2014/main" id="{14625A65-1375-4462-894C-E356A01CC925}"/>
+              </a:ext>
+            </a:extLst>
+          </p:cNvPr>
+          <p:cNvPicPr>
+            <a:picLocks noChangeAspect="1"/>
+          </p:cNvPicPr>
+          <p:nvPr/>
+        </p:nvPicPr>
+        <p:blipFill>
+          <a:blip r:embed="rId3">
+            <a:extLst>
+              <a:ext uri="{28A0092B-C50C-407E-A947-70E740481C1C}">
+                <a14:useLocalDpi xmlns:a14="http://schemas.microsoft.com/office/drawing/2010/main" val="0"/>
+              </a:ext>
+            </a:extLst>
+          </a:blip>
+          <a:stretch>
+            <a:fillRect/>
+          </a:stretch>
+        </p:blipFill>
+        <p:spPr>
+          <a:xfrm>
+            <a:off x="7945355" y="3614730"/>
+            <a:ext cx="3728775" cy="2799381"/>
+          </a:xfrm>
+          <a:prstGeom prst="rect">
+            <a:avLst/>
+          </a:prstGeom>
+        </p:spPr>
+      </p:pic>
+      <p:sp>
+        <p:nvSpPr>
+          <p:cNvPr id="8" name="TextBox 7">
+            <a:extLst>
+              <a:ext uri="{FF2B5EF4-FFF2-40B4-BE49-F238E27FC236}">
+                <a16:creationId xmlns:a16="http://schemas.microsoft.com/office/drawing/2014/main" id="{EA9F4666-F997-4468-93E4-A3C378762A52}"/>
+              </a:ext>
+            </a:extLst>
+          </p:cNvPr>
+          <p:cNvSpPr txBox="1"/>
+          <p:nvPr/>
+        </p:nvSpPr>
+        <p:spPr>
+          <a:xfrm>
+            <a:off x="517869" y="2118050"/>
+            <a:ext cx="6016175" cy="2585323"/>
+          </a:xfrm>
+          <a:prstGeom prst="rect">
+            <a:avLst/>
+          </a:prstGeom>
+          <a:noFill/>
+        </p:spPr>
+        <p:txBody>
+          <a:bodyPr wrap="square" rtlCol="0">
+            <a:spAutoFit/>
           </a:bodyPr>
           <a:lstStyle/>
           <a:p>
-            <a:r>
-              <a:rPr lang="nb-NO" sz="1800" dirty="0" err="1"/>
-              <a:t>Causal</a:t>
-            </a:r>
-            <a:r>
-              <a:rPr lang="nb-NO" sz="1800" dirty="0"/>
-              <a:t> </a:t>
-            </a:r>
-            <a:r>
-              <a:rPr lang="nb-NO" sz="1800" dirty="0" err="1"/>
-              <a:t>padding</a:t>
-            </a:r>
-            <a:r>
-              <a:rPr lang="nb-NO" sz="1800" dirty="0"/>
-              <a:t> is not </a:t>
-            </a:r>
-            <a:r>
-              <a:rPr lang="nb-NO" sz="1800" dirty="0" err="1"/>
-              <a:t>supported</a:t>
-            </a:r>
-            <a:r>
-              <a:rPr lang="nb-NO" sz="1800" dirty="0"/>
-              <a:t> for Conv2D</a:t>
-            </a:r>
-          </a:p>
-          <a:p>
-            <a:r>
-              <a:rPr lang="nb-NO" sz="1800" dirty="0"/>
-              <a:t>	</a:t>
-            </a:r>
-            <a:r>
-              <a:rPr lang="nb-NO" sz="1800" dirty="0" err="1"/>
-              <a:t>Discussion</a:t>
-            </a:r>
-            <a:r>
-              <a:rPr lang="nb-NO" sz="1800" dirty="0"/>
-              <a:t> </a:t>
-            </a:r>
-            <a:r>
-              <a:rPr lang="nb-NO" sz="1800" dirty="0" err="1"/>
-              <a:t>around</a:t>
-            </a:r>
-            <a:r>
-              <a:rPr lang="nb-NO" sz="1800" dirty="0"/>
-              <a:t> </a:t>
-            </a:r>
-            <a:r>
-              <a:rPr lang="nb-NO" sz="1800" dirty="0" err="1"/>
-              <a:t>this</a:t>
-            </a:r>
-            <a:endParaRPr lang="nb-NO" sz="1800" dirty="0"/>
-          </a:p>
-          <a:p>
-            <a:endParaRPr lang="en-GB" sz="1800" dirty="0"/>
+            <a:endParaRPr lang="nb-NO" dirty="0"/>
+          </a:p>
+          <a:p>
+            <a:r>
+              <a:rPr lang="nb-NO" dirty="0" err="1"/>
+              <a:t>Config</a:t>
+            </a:r>
+            <a:r>
+              <a:rPr lang="nb-NO" dirty="0"/>
+              <a:t>:</a:t>
+            </a:r>
+          </a:p>
+          <a:p>
+            <a:r>
+              <a:rPr lang="nb-NO" dirty="0" err="1"/>
+              <a:t>nb_filters</a:t>
+            </a:r>
+            <a:r>
+              <a:rPr lang="nb-NO" dirty="0"/>
+              <a:t> = 	</a:t>
+            </a:r>
+          </a:p>
+          <a:p>
+            <a:r>
+              <a:rPr lang="nb-NO" dirty="0" err="1"/>
+              <a:t>Kernel</a:t>
+            </a:r>
+            <a:r>
+              <a:rPr lang="nb-NO" dirty="0"/>
+              <a:t> </a:t>
+            </a:r>
+            <a:r>
+              <a:rPr lang="nb-NO" dirty="0" err="1"/>
+              <a:t>size</a:t>
+            </a:r>
+            <a:r>
+              <a:rPr lang="nb-NO" dirty="0"/>
+              <a:t> = 	</a:t>
+            </a:r>
+          </a:p>
+          <a:p>
+            <a:r>
+              <a:rPr lang="nb-NO" dirty="0" err="1"/>
+              <a:t>Dilations</a:t>
+            </a:r>
+            <a:r>
+              <a:rPr lang="nb-NO" dirty="0"/>
+              <a:t> = 	</a:t>
+            </a:r>
+          </a:p>
+          <a:p>
+            <a:r>
+              <a:rPr lang="nb-NO" dirty="0" err="1"/>
+              <a:t>batch_size</a:t>
+            </a:r>
+            <a:r>
+              <a:rPr lang="nb-NO" dirty="0"/>
+              <a:t> = 	</a:t>
+            </a:r>
+          </a:p>
+          <a:p>
+            <a:r>
+              <a:rPr lang="nb-NO" dirty="0" err="1"/>
+              <a:t>Epochs</a:t>
+            </a:r>
+            <a:r>
+              <a:rPr lang="nb-NO" dirty="0"/>
+              <a:t> = 	</a:t>
+            </a:r>
+          </a:p>
+          <a:p>
+            <a:endParaRPr lang="en-GB" dirty="0"/>
+          </a:p>
+          <a:p>
+            <a:r>
+              <a:rPr lang="en-GB" dirty="0"/>
+              <a:t>Loss = </a:t>
+            </a:r>
+          </a:p>
+        </p:txBody>
+      </p:sp>
+      <p:sp>
+        <p:nvSpPr>
+          <p:cNvPr id="9" name="TextBox 8">
+            <a:extLst>
+              <a:ext uri="{FF2B5EF4-FFF2-40B4-BE49-F238E27FC236}">
+                <a16:creationId xmlns:a16="http://schemas.microsoft.com/office/drawing/2014/main" id="{ECEC4A22-A1B3-40C4-9970-2B95DA8A4E2A}"/>
+              </a:ext>
+            </a:extLst>
+          </p:cNvPr>
+          <p:cNvSpPr txBox="1"/>
+          <p:nvPr/>
+        </p:nvSpPr>
+        <p:spPr>
+          <a:xfrm>
+            <a:off x="6610525" y="2875908"/>
+            <a:ext cx="1258348" cy="369332"/>
+          </a:xfrm>
+          <a:prstGeom prst="rect">
+            <a:avLst/>
+          </a:prstGeom>
+          <a:noFill/>
+        </p:spPr>
+        <p:txBody>
+          <a:bodyPr wrap="square" rtlCol="0">
+            <a:spAutoFit/>
+          </a:bodyPr>
+          <a:lstStyle/>
+          <a:p>
+            <a:pPr algn="ctr"/>
+            <a:r>
+              <a:rPr lang="nb-NO" dirty="0" err="1"/>
+              <a:t>Predicted</a:t>
+            </a:r>
+            <a:endParaRPr lang="en-GB" dirty="0"/>
+          </a:p>
+        </p:txBody>
+      </p:sp>
+      <p:sp>
+        <p:nvSpPr>
+          <p:cNvPr id="10" name="TextBox 9">
+            <a:extLst>
+              <a:ext uri="{FF2B5EF4-FFF2-40B4-BE49-F238E27FC236}">
+                <a16:creationId xmlns:a16="http://schemas.microsoft.com/office/drawing/2014/main" id="{9A3B85A9-FC18-4394-ADEC-47CF69CAF029}"/>
+              </a:ext>
+            </a:extLst>
+          </p:cNvPr>
+          <p:cNvSpPr txBox="1"/>
+          <p:nvPr/>
+        </p:nvSpPr>
+        <p:spPr>
+          <a:xfrm>
+            <a:off x="6610524" y="5998127"/>
+            <a:ext cx="1258349" cy="369332"/>
+          </a:xfrm>
+          <a:prstGeom prst="rect">
+            <a:avLst/>
+          </a:prstGeom>
+          <a:noFill/>
+        </p:spPr>
+        <p:txBody>
+          <a:bodyPr wrap="square" rtlCol="0">
+            <a:spAutoFit/>
+          </a:bodyPr>
+          <a:lstStyle/>
+          <a:p>
+            <a:pPr algn="ctr"/>
+            <a:r>
+              <a:rPr lang="nb-NO" dirty="0"/>
+              <a:t>True</a:t>
+            </a:r>
+            <a:endParaRPr lang="en-GB" dirty="0"/>
           </a:p>
         </p:txBody>
       </p:sp>
     </p:spTree>
     <p:extLst>
       <p:ext uri="{BB962C8B-B14F-4D97-AF65-F5344CB8AC3E}">
-        <p14:creationId xmlns:p14="http://schemas.microsoft.com/office/powerpoint/2010/main" val="1721430244"/>
+        <p14:creationId xmlns:p14="http://schemas.microsoft.com/office/powerpoint/2010/main" val="2341598790"/>
       </p:ext>
     </p:extLst>
   </p:cSld>

</xml_diff>

<commit_message>
Prediction image for AAE and instructions for next
</commit_message>
<xml_diff>
--- a/Meeting Presentations/06.10.2022_General_meeting.pptx
+++ b/Meeting Presentations/06.10.2022_General_meeting.pptx
@@ -281,7 +281,7 @@
           <a:p>
             <a:fld id="{5E7AA473-D82F-4EFF-9DF7-AE6D83C51288}" type="datetime1">
               <a:rPr lang="en-US" smtClean="0"/>
-              <a:t>9/29/2022</a:t>
+              <a:t>10/4/2022</a:t>
             </a:fld>
             <a:endParaRPr lang="en-US"/>
           </a:p>
@@ -535,7 +535,7 @@
           <a:p>
             <a:fld id="{1E12F1F0-FE2D-4C1C-B320-8CB9BE735F0F}" type="datetime1">
               <a:rPr lang="en-US" smtClean="0"/>
-              <a:t>9/29/2022</a:t>
+              <a:t>10/4/2022</a:t>
             </a:fld>
             <a:endParaRPr lang="en-US"/>
           </a:p>
@@ -803,7 +803,7 @@
           <a:p>
             <a:fld id="{2CF1B96C-10FD-4EBC-9029-9652B7535D02}" type="datetime1">
               <a:rPr lang="en-US" smtClean="0"/>
-              <a:t>9/29/2022</a:t>
+              <a:t>10/4/2022</a:t>
             </a:fld>
             <a:endParaRPr lang="en-US"/>
           </a:p>
@@ -1057,7 +1057,7 @@
           <a:p>
             <a:fld id="{14878474-CC00-4A95-9D50-A41C12D1EEC4}" type="datetime1">
               <a:rPr lang="en-US" smtClean="0"/>
-              <a:t>9/29/2022</a:t>
+              <a:t>10/4/2022</a:t>
             </a:fld>
             <a:endParaRPr lang="en-US"/>
           </a:p>
@@ -1335,7 +1335,7 @@
           <a:p>
             <a:fld id="{7F38C8B4-7FBB-408F-BDB9-F0496874AFB2}" type="datetime1">
               <a:rPr lang="en-US" smtClean="0"/>
-              <a:t>9/29/2022</a:t>
+              <a:t>10/4/2022</a:t>
             </a:fld>
             <a:endParaRPr lang="en-US"/>
           </a:p>
@@ -1607,7 +1607,7 @@
           <a:p>
             <a:fld id="{2BB8EE20-A5E2-47D3-8F6D-A2BA7AB2E093}" type="datetime1">
               <a:rPr lang="en-US" smtClean="0"/>
-              <a:t>9/29/2022</a:t>
+              <a:t>10/4/2022</a:t>
             </a:fld>
             <a:endParaRPr lang="en-US"/>
           </a:p>
@@ -2165,7 +2165,7 @@
           <a:p>
             <a:fld id="{3382CF99-132F-413F-B7EF-71A5C33F2ED6}" type="datetime1">
               <a:rPr lang="en-US" smtClean="0"/>
-              <a:t>9/29/2022</a:t>
+              <a:t>10/4/2022</a:t>
             </a:fld>
             <a:endParaRPr lang="en-US"/>
           </a:p>
@@ -2307,7 +2307,7 @@
           <a:p>
             <a:fld id="{1F17AE06-98E0-4D9F-A059-92C3548821BB}" type="datetime1">
               <a:rPr lang="en-US" smtClean="0"/>
-              <a:t>9/29/2022</a:t>
+              <a:t>10/4/2022</a:t>
             </a:fld>
             <a:endParaRPr lang="en-US"/>
           </a:p>
@@ -2420,7 +2420,7 @@
           <a:p>
             <a:fld id="{FFBA00CA-3DDC-4705-B840-978EF5EA0707}" type="datetime1">
               <a:rPr lang="en-US" smtClean="0"/>
-              <a:t>9/29/2022</a:t>
+              <a:t>10/4/2022</a:t>
             </a:fld>
             <a:endParaRPr lang="en-US"/>
           </a:p>
@@ -2739,7 +2739,7 @@
           <a:p>
             <a:fld id="{FC366D49-0BBA-4C5A-AD96-6448CA63451A}" type="datetime1">
               <a:rPr lang="en-US" smtClean="0"/>
-              <a:t>9/29/2022</a:t>
+              <a:t>10/4/2022</a:t>
             </a:fld>
             <a:endParaRPr lang="en-US"/>
           </a:p>
@@ -3036,7 +3036,7 @@
           <a:p>
             <a:fld id="{4F4EB293-A316-472D-A8B4-6947CF1A12B7}" type="datetime1">
               <a:rPr lang="en-US" smtClean="0"/>
-              <a:t>9/29/2022</a:t>
+              <a:t>10/4/2022</a:t>
             </a:fld>
             <a:endParaRPr lang="en-US"/>
           </a:p>
@@ -3315,7 +3315,7 @@
           <a:p>
             <a:fld id="{734BCCD4-CEB1-405B-A443-DD9CBCBEA552}" type="datetime1">
               <a:rPr lang="en-US" smtClean="0"/>
-              <a:t>9/29/2022</a:t>
+              <a:t>10/4/2022</a:t>
             </a:fld>
             <a:endParaRPr lang="en-US"/>
           </a:p>

</xml_diff>